<commit_message>
Numerical fuzzing hands-on exercise
</commit_message>
<xml_diff>
--- a/testing-debugging-profiling.pptx
+++ b/testing-debugging-profiling.pptx
@@ -42163,7 +42163,7 @@
             </a:r>
             <a:r>
               <a:rPr lang="en-US" dirty="0" smtClean="0"/>
-              <a:t> – example</a:t>
+              <a:t> – solution</a:t>
             </a:r>
             <a:endParaRPr lang="en-US" dirty="0"/>
           </a:p>
@@ -42178,7 +42178,7 @@
         <p:spPr>
           <a:xfrm>
             <a:off x="609600" y="1295400"/>
-            <a:ext cx="8077200" cy="3108544"/>
+            <a:ext cx="8077200" cy="4616648"/>
           </a:xfrm>
           <a:prstGeom prst="rect">
             <a:avLst/>
@@ -42192,227 +42192,121 @@
           <a:lstStyle/>
           <a:p>
             <a:r>
-              <a:rPr lang="en-US" sz="1400" dirty="0" smtClean="0">
-                <a:solidFill>
-                  <a:srgbClr val="0000FF"/>
-                </a:solidFill>
+              <a:rPr lang="en-US" sz="1400" dirty="0">
                 <a:latin typeface="Courier New" pitchFamily="49" charset="0"/>
                 <a:cs typeface="Courier New" pitchFamily="49" charset="0"/>
               </a:rPr>
-              <a:t>class </a:t>
-            </a:r>
-            <a:r>
-              <a:rPr lang="en-US" sz="1400" b="1" dirty="0" err="1" smtClean="0">
-                <a:latin typeface="Courier New" pitchFamily="49" charset="0"/>
-                <a:cs typeface="Courier New" pitchFamily="49" charset="0"/>
-              </a:rPr>
-              <a:t>VarianceTestCase</a:t>
-            </a:r>
-            <a:r>
-              <a:rPr lang="en-US" sz="1400" b="1" dirty="0" smtClean="0">
-                <a:latin typeface="Courier New" pitchFamily="49" charset="0"/>
-                <a:cs typeface="Courier New" pitchFamily="49" charset="0"/>
-              </a:rPr>
-              <a:t>(</a:t>
-            </a:r>
-            <a:r>
-              <a:rPr lang="en-US" sz="1400" b="1" dirty="0" err="1" smtClean="0">
-                <a:latin typeface="Courier New" pitchFamily="49" charset="0"/>
-                <a:cs typeface="Courier New" pitchFamily="49" charset="0"/>
-              </a:rPr>
-              <a:t>unittest.TestCase</a:t>
-            </a:r>
-            <a:r>
-              <a:rPr lang="en-US" sz="1400" b="1" dirty="0" smtClean="0">
-                <a:latin typeface="Courier New" pitchFamily="49" charset="0"/>
-                <a:cs typeface="Courier New" pitchFamily="49" charset="0"/>
-              </a:rPr>
-              <a:t>):</a:t>
-            </a:r>
-            <a:endParaRPr sz="1400" b="1" dirty="0">
+              <a:t>class TestVar(unittest.TestCase):</a:t>
+            </a:r>
+          </a:p>
+          <a:p>
+            <a:endParaRPr lang="en-US" sz="1400" dirty="0">
               <a:latin typeface="Courier New" pitchFamily="49" charset="0"/>
               <a:cs typeface="Courier New" pitchFamily="49" charset="0"/>
             </a:endParaRPr>
           </a:p>
           <a:p>
-            <a:endParaRPr lang="en-US" sz="1400" dirty="0" smtClean="0">
-              <a:solidFill>
-                <a:srgbClr val="0000FF"/>
-              </a:solidFill>
+            <a:r>
+              <a:rPr lang="en-US" sz="1400" dirty="0">
+                <a:latin typeface="Courier New" pitchFamily="49" charset="0"/>
+                <a:cs typeface="Courier New" pitchFamily="49" charset="0"/>
+              </a:rPr>
+              <a:t>    def test_var_deterministic(self):</a:t>
+            </a:r>
+          </a:p>
+          <a:p>
+            <a:r>
+              <a:rPr lang="en-US" sz="1400" dirty="0">
+                <a:latin typeface="Courier New" pitchFamily="49" charset="0"/>
+                <a:cs typeface="Courier New" pitchFamily="49" charset="0"/>
+              </a:rPr>
+              <a:t>        x = numpy.array([-2.0, 2.0])</a:t>
+            </a:r>
+          </a:p>
+          <a:p>
+            <a:r>
+              <a:rPr lang="en-US" sz="1400" dirty="0">
+                <a:latin typeface="Courier New" pitchFamily="49" charset="0"/>
+                <a:cs typeface="Courier New" pitchFamily="49" charset="0"/>
+              </a:rPr>
+              <a:t>        expected = 4.0</a:t>
+            </a:r>
+          </a:p>
+          <a:p>
+            <a:r>
+              <a:rPr lang="en-US" sz="1400" dirty="0">
+                <a:latin typeface="Courier New" pitchFamily="49" charset="0"/>
+                <a:cs typeface="Courier New" pitchFamily="49" charset="0"/>
+              </a:rPr>
+              <a:t>        self.assertAlmostEqual(numpy.var(x), expected)</a:t>
+            </a:r>
+          </a:p>
+          <a:p>
+            <a:endParaRPr lang="en-US" sz="1400" dirty="0">
               <a:latin typeface="Courier New" pitchFamily="49" charset="0"/>
               <a:cs typeface="Courier New" pitchFamily="49" charset="0"/>
             </a:endParaRPr>
           </a:p>
           <a:p>
             <a:r>
-              <a:rPr lang="en-US" sz="1400" dirty="0" smtClean="0">
-                <a:solidFill>
-                  <a:srgbClr val="0000FF"/>
-                </a:solidFill>
+              <a:rPr lang="en-US" sz="1400" dirty="0">
                 <a:latin typeface="Courier New" pitchFamily="49" charset="0"/>
                 <a:cs typeface="Courier New" pitchFamily="49" charset="0"/>
               </a:rPr>
-              <a:t>    def </a:t>
-            </a:r>
-            <a:r>
-              <a:rPr lang="en-US" sz="1400" b="1" dirty="0" err="1" smtClean="0">
-                <a:solidFill>
-                  <a:srgbClr val="000000"/>
-                </a:solidFill>
+              <a:t>    def test_var_fuzzing(self):</a:t>
+            </a:r>
+          </a:p>
+          <a:p>
+            <a:r>
+              <a:rPr lang="en-US" sz="1400" dirty="0">
                 <a:latin typeface="Courier New" pitchFamily="49" charset="0"/>
                 <a:cs typeface="Courier New" pitchFamily="49" charset="0"/>
               </a:rPr>
-              <a:t>test_var</a:t>
-            </a:r>
-            <a:r>
-              <a:rPr lang="en-US" sz="1400" b="1" dirty="0" smtClean="0">
-                <a:solidFill>
-                  <a:srgbClr val="000000"/>
-                </a:solidFill>
-                <a:latin typeface="Courier New" pitchFamily="49" charset="0"/>
-                <a:cs typeface="Courier New" pitchFamily="49" charset="0"/>
-              </a:rPr>
-              <a:t>(</a:t>
-            </a:r>
-            <a:r>
-              <a:rPr lang="en-US" sz="1400" b="1" i="1" dirty="0" smtClean="0">
-                <a:solidFill>
-                  <a:srgbClr val="000000"/>
-                </a:solidFill>
-                <a:latin typeface="Courier New" pitchFamily="49" charset="0"/>
-                <a:cs typeface="Courier New" pitchFamily="49" charset="0"/>
-              </a:rPr>
-              <a:t>self):</a:t>
-            </a:r>
-          </a:p>
-          <a:p>
-            <a:r>
-              <a:rPr lang="en-US" sz="1400" dirty="0" smtClean="0">
-                <a:solidFill>
-                  <a:srgbClr val="000000"/>
-                </a:solidFill>
-                <a:latin typeface="Courier New" pitchFamily="49" charset="0"/>
-                <a:cs typeface="Courier New" pitchFamily="49" charset="0"/>
-              </a:rPr>
-              <a:t>        N, D = </a:t>
-            </a:r>
-            <a:r>
-              <a:rPr lang="en-US" sz="1400" dirty="0" smtClean="0">
-                <a:solidFill>
-                  <a:srgbClr val="800000"/>
-                </a:solidFill>
-                <a:latin typeface="Courier New" pitchFamily="49" charset="0"/>
-                <a:cs typeface="Courier New" pitchFamily="49" charset="0"/>
-              </a:rPr>
-              <a:t>100000</a:t>
-            </a:r>
-            <a:r>
-              <a:rPr lang="en-US" sz="1400" dirty="0" smtClean="0">
-                <a:solidFill>
-                  <a:srgbClr val="000000"/>
-                </a:solidFill>
-                <a:latin typeface="Courier New" pitchFamily="49" charset="0"/>
-                <a:cs typeface="Courier New" pitchFamily="49" charset="0"/>
-              </a:rPr>
-              <a:t>, </a:t>
-            </a:r>
-            <a:r>
-              <a:rPr lang="en-US" sz="1400" dirty="0" smtClean="0">
-                <a:solidFill>
-                  <a:srgbClr val="800000"/>
-                </a:solidFill>
-                <a:latin typeface="Courier New" pitchFamily="49" charset="0"/>
-                <a:cs typeface="Courier New" pitchFamily="49" charset="0"/>
-              </a:rPr>
-              <a:t>5</a:t>
-            </a:r>
-            <a:endParaRPr lang="en-US" sz="1400" i="1" dirty="0" smtClean="0">
-              <a:solidFill>
-                <a:srgbClr val="9E0001"/>
-              </a:solidFill>
+              <a:t>        rand_state = numpy.random.RandomState(8393)</a:t>
+            </a:r>
+          </a:p>
+          <a:p>
+            <a:endParaRPr lang="en-US" sz="1400" dirty="0">
               <a:latin typeface="Courier New" pitchFamily="49" charset="0"/>
               <a:cs typeface="Courier New" pitchFamily="49" charset="0"/>
             </a:endParaRPr>
           </a:p>
           <a:p>
             <a:r>
-              <a:rPr lang="en-US" sz="1400" i="1" dirty="0" smtClean="0">
-                <a:solidFill>
-                  <a:srgbClr val="9E0001"/>
-                </a:solidFill>
+              <a:rPr lang="en-US" sz="1400" dirty="0">
                 <a:latin typeface="Courier New" pitchFamily="49" charset="0"/>
                 <a:cs typeface="Courier New" pitchFamily="49" charset="0"/>
               </a:rPr>
-              <a:t>        # Goal variances: [0.1 ,  0.45,  0.8 ,  1.15,  1.5]</a:t>
-            </a:r>
-          </a:p>
-          <a:p>
-            <a:r>
-              <a:rPr lang="en-US" sz="1400" dirty="0" smtClean="0">
-                <a:solidFill>
-                  <a:srgbClr val="000000"/>
-                </a:solidFill>
+              <a:t>        N, D = 100000, 5</a:t>
+            </a:r>
+          </a:p>
+          <a:p>
+            <a:r>
+              <a:rPr lang="en-US" sz="1400" dirty="0">
                 <a:latin typeface="Courier New" pitchFamily="49" charset="0"/>
                 <a:cs typeface="Courier New" pitchFamily="49" charset="0"/>
               </a:rPr>
-              <a:t>        expected = numpy.linspace(</a:t>
-            </a:r>
-            <a:r>
-              <a:rPr lang="en-US" sz="1400" dirty="0" smtClean="0">
-                <a:solidFill>
-                  <a:srgbClr val="800000"/>
-                </a:solidFill>
+              <a:t>        # Goal variances: [0.1 ,  0.45,  0.8 ,  1.15,  1.5]</a:t>
+            </a:r>
+          </a:p>
+          <a:p>
+            <a:r>
+              <a:rPr lang="en-US" sz="1400" dirty="0">
                 <a:latin typeface="Courier New" pitchFamily="49" charset="0"/>
                 <a:cs typeface="Courier New" pitchFamily="49" charset="0"/>
               </a:rPr>
-              <a:t>0.1</a:t>
-            </a:r>
-            <a:r>
-              <a:rPr lang="en-US" sz="1400" dirty="0" smtClean="0">
-                <a:solidFill>
-                  <a:srgbClr val="000000"/>
-                </a:solidFill>
-                <a:latin typeface="Courier New" pitchFamily="49" charset="0"/>
-                <a:cs typeface="Courier New" pitchFamily="49" charset="0"/>
-              </a:rPr>
-              <a:t>, </a:t>
-            </a:r>
-            <a:r>
-              <a:rPr lang="en-US" sz="1400" dirty="0" smtClean="0">
-                <a:solidFill>
-                  <a:srgbClr val="800000"/>
-                </a:solidFill>
-                <a:latin typeface="Courier New" pitchFamily="49" charset="0"/>
-                <a:cs typeface="Courier New" pitchFamily="49" charset="0"/>
-              </a:rPr>
-              <a:t>1.5</a:t>
-            </a:r>
-            <a:r>
-              <a:rPr lang="en-US" sz="1400" dirty="0" smtClean="0">
-                <a:solidFill>
-                  <a:srgbClr val="000000"/>
-                </a:solidFill>
-                <a:latin typeface="Courier New" pitchFamily="49" charset="0"/>
-                <a:cs typeface="Courier New" pitchFamily="49" charset="0"/>
-              </a:rPr>
-              <a:t>, D)</a:t>
-            </a:r>
-          </a:p>
-          <a:p>
-            <a:endParaRPr lang="en-US" sz="1400" i="1" dirty="0" smtClean="0">
-              <a:solidFill>
-                <a:srgbClr val="9E0001"/>
-              </a:solidFill>
+              <a:t>        expected = numpy.linspace(0.1, 1.5, D)</a:t>
+            </a:r>
+          </a:p>
+          <a:p>
+            <a:endParaRPr lang="en-US" sz="1400" dirty="0">
               <a:latin typeface="Courier New" pitchFamily="49" charset="0"/>
               <a:cs typeface="Courier New" pitchFamily="49" charset="0"/>
             </a:endParaRPr>
           </a:p>
           <a:p>
             <a:r>
-              <a:rPr lang="en-US" sz="1400" i="1" dirty="0" smtClean="0">
-                <a:solidFill>
-                  <a:srgbClr val="9E0001"/>
-                </a:solidFill>
+              <a:rPr lang="en-US" sz="1400" dirty="0">
                 <a:latin typeface="Courier New" pitchFamily="49" charset="0"/>
                 <a:cs typeface="Courier New" pitchFamily="49" charset="0"/>
               </a:rPr>
@@ -42421,242 +42315,47 @@
           </a:p>
           <a:p>
             <a:r>
-              <a:rPr lang="en-US" sz="1400" dirty="0" smtClean="0">
-                <a:solidFill>
-                  <a:srgbClr val="0000FF"/>
-                </a:solidFill>
+              <a:rPr lang="en-US" sz="1400" dirty="0">
                 <a:latin typeface="Courier New" pitchFamily="49" charset="0"/>
                 <a:cs typeface="Courier New" pitchFamily="49" charset="0"/>
               </a:rPr>
-              <a:t>        for</a:t>
-            </a:r>
-            <a:r>
-              <a:rPr lang="en-US" sz="1400" dirty="0" smtClean="0">
-                <a:solidFill>
-                  <a:srgbClr val="000000"/>
-                </a:solidFill>
+              <a:t>        for _ in range(20):</a:t>
+            </a:r>
+          </a:p>
+          <a:p>
+            <a:r>
+              <a:rPr lang="en-US" sz="1400" dirty="0">
                 <a:latin typeface="Courier New" pitchFamily="49" charset="0"/>
                 <a:cs typeface="Courier New" pitchFamily="49" charset="0"/>
               </a:rPr>
-              <a:t> _ </a:t>
-            </a:r>
-            <a:r>
-              <a:rPr lang="en-US" sz="1400" dirty="0" smtClean="0">
-                <a:solidFill>
-                  <a:srgbClr val="0000FF"/>
-                </a:solidFill>
+              <a:t>            # Generate random, D-dimensional data</a:t>
+            </a:r>
+          </a:p>
+          <a:p>
+            <a:r>
+              <a:rPr lang="en-US" sz="1400" dirty="0">
                 <a:latin typeface="Courier New" pitchFamily="49" charset="0"/>
                 <a:cs typeface="Courier New" pitchFamily="49" charset="0"/>
               </a:rPr>
-              <a:t>in</a:t>
-            </a:r>
-            <a:r>
-              <a:rPr lang="en-US" sz="1400" dirty="0" smtClean="0">
-                <a:solidFill>
-                  <a:srgbClr val="000000"/>
-                </a:solidFill>
+              <a:t>            x = rand_state.randn(N, D) * numpy.sqrt(expected)</a:t>
+            </a:r>
+          </a:p>
+          <a:p>
+            <a:r>
+              <a:rPr lang="en-US" sz="1400" dirty="0">
                 <a:latin typeface="Courier New" pitchFamily="49" charset="0"/>
                 <a:cs typeface="Courier New" pitchFamily="49" charset="0"/>
               </a:rPr>
-              <a:t> range(</a:t>
-            </a:r>
-            <a:r>
-              <a:rPr lang="en-US" sz="1400" dirty="0" smtClean="0">
-                <a:solidFill>
-                  <a:srgbClr val="800000"/>
-                </a:solidFill>
+              <a:t>            variance = numpy.var(x, axis=0)</a:t>
+            </a:r>
+          </a:p>
+          <a:p>
+            <a:r>
+              <a:rPr lang="en-US" sz="1400" dirty="0">
                 <a:latin typeface="Courier New" pitchFamily="49" charset="0"/>
                 <a:cs typeface="Courier New" pitchFamily="49" charset="0"/>
               </a:rPr>
-              <a:t>20</a:t>
-            </a:r>
-            <a:r>
-              <a:rPr lang="en-US" sz="1400" dirty="0" smtClean="0">
-                <a:solidFill>
-                  <a:srgbClr val="000000"/>
-                </a:solidFill>
-                <a:latin typeface="Courier New" pitchFamily="49" charset="0"/>
-                <a:cs typeface="Courier New" pitchFamily="49" charset="0"/>
-              </a:rPr>
-              <a:t>):</a:t>
-            </a:r>
-          </a:p>
-          <a:p>
-            <a:r>
-              <a:rPr lang="en-US" sz="1400" i="1" dirty="0" smtClean="0">
-                <a:solidFill>
-                  <a:srgbClr val="9E0001"/>
-                </a:solidFill>
-                <a:latin typeface="Courier New" pitchFamily="49" charset="0"/>
-                <a:cs typeface="Courier New" pitchFamily="49" charset="0"/>
-              </a:rPr>
-              <a:t>            # Generate random, D-dimensional data</a:t>
-            </a:r>
-          </a:p>
-          <a:p>
-            <a:r>
-              <a:rPr lang="en-US" sz="1400" dirty="0" smtClean="0">
-                <a:solidFill>
-                  <a:srgbClr val="000000"/>
-                </a:solidFill>
-                <a:latin typeface="Courier New" pitchFamily="49" charset="0"/>
-                <a:cs typeface="Courier New" pitchFamily="49" charset="0"/>
-              </a:rPr>
-              <a:t>            x = </a:t>
-            </a:r>
-            <a:r>
-              <a:rPr lang="en-US" sz="1400" dirty="0" err="1" smtClean="0">
-                <a:solidFill>
-                  <a:srgbClr val="000000"/>
-                </a:solidFill>
-                <a:latin typeface="Courier New" pitchFamily="49" charset="0"/>
-                <a:cs typeface="Courier New" pitchFamily="49" charset="0"/>
-              </a:rPr>
-              <a:t>numpy.random.randn</a:t>
-            </a:r>
-            <a:r>
-              <a:rPr lang="en-US" sz="1400" dirty="0" smtClean="0">
-                <a:solidFill>
-                  <a:srgbClr val="000000"/>
-                </a:solidFill>
-                <a:latin typeface="Courier New" pitchFamily="49" charset="0"/>
-                <a:cs typeface="Courier New" pitchFamily="49" charset="0"/>
-              </a:rPr>
-              <a:t>(N, D) * </a:t>
-            </a:r>
-            <a:r>
-              <a:rPr lang="en-US" sz="1400" dirty="0" err="1" smtClean="0">
-                <a:solidFill>
-                  <a:srgbClr val="000000"/>
-                </a:solidFill>
-                <a:latin typeface="Courier New" pitchFamily="49" charset="0"/>
-                <a:cs typeface="Courier New" pitchFamily="49" charset="0"/>
-              </a:rPr>
-              <a:t>numpy.sqrt</a:t>
-            </a:r>
-            <a:r>
-              <a:rPr lang="en-US" sz="1400" dirty="0" smtClean="0">
-                <a:solidFill>
-                  <a:srgbClr val="000000"/>
-                </a:solidFill>
-                <a:latin typeface="Courier New" pitchFamily="49" charset="0"/>
-                <a:cs typeface="Courier New" pitchFamily="49" charset="0"/>
-              </a:rPr>
-              <a:t>(desired)</a:t>
-            </a:r>
-          </a:p>
-          <a:p>
-            <a:r>
-              <a:rPr lang="en-US" sz="1400" dirty="0">
-                <a:solidFill>
-                  <a:srgbClr val="000000"/>
-                </a:solidFill>
-                <a:latin typeface="Courier New" pitchFamily="49" charset="0"/>
-                <a:cs typeface="Courier New" pitchFamily="49" charset="0"/>
-              </a:rPr>
-              <a:t>            </a:t>
-            </a:r>
-            <a:r>
-              <a:rPr lang="en-US" sz="1400" dirty="0" smtClean="0">
-                <a:solidFill>
-                  <a:srgbClr val="000000"/>
-                </a:solidFill>
-                <a:latin typeface="Courier New" pitchFamily="49" charset="0"/>
-                <a:cs typeface="Courier New" pitchFamily="49" charset="0"/>
-              </a:rPr>
-              <a:t>variance = </a:t>
-            </a:r>
-            <a:r>
-              <a:rPr lang="en-US" sz="1400" dirty="0" err="1" smtClean="0">
-                <a:solidFill>
-                  <a:srgbClr val="000000"/>
-                </a:solidFill>
-                <a:latin typeface="Courier New" pitchFamily="49" charset="0"/>
-                <a:cs typeface="Courier New" pitchFamily="49" charset="0"/>
-              </a:rPr>
-              <a:t>numpy.var(x</a:t>
-            </a:r>
-            <a:r>
-              <a:rPr lang="en-US" sz="1400" dirty="0" smtClean="0">
-                <a:solidFill>
-                  <a:srgbClr val="000000"/>
-                </a:solidFill>
-                <a:latin typeface="Courier New" pitchFamily="49" charset="0"/>
-                <a:cs typeface="Courier New" pitchFamily="49" charset="0"/>
-              </a:rPr>
-              <a:t>, axis=</a:t>
-            </a:r>
-            <a:r>
-              <a:rPr lang="en-US" sz="1400" dirty="0" smtClean="0">
-                <a:solidFill>
-                  <a:srgbClr val="800000"/>
-                </a:solidFill>
-                <a:latin typeface="Courier New" pitchFamily="49" charset="0"/>
-                <a:cs typeface="Courier New" pitchFamily="49" charset="0"/>
-              </a:rPr>
-              <a:t>0</a:t>
-            </a:r>
-            <a:r>
-              <a:rPr lang="en-US" sz="1400" dirty="0" smtClean="0">
-                <a:solidFill>
-                  <a:srgbClr val="000000"/>
-                </a:solidFill>
-                <a:latin typeface="Courier New" pitchFamily="49" charset="0"/>
-                <a:cs typeface="Courier New" pitchFamily="49" charset="0"/>
-              </a:rPr>
-              <a:t>)</a:t>
-            </a:r>
-          </a:p>
-          <a:p>
-            <a:r>
-              <a:rPr lang="en-US" sz="1400" dirty="0" smtClean="0">
-                <a:solidFill>
-                  <a:srgbClr val="000000"/>
-                </a:solidFill>
-                <a:latin typeface="Courier New" pitchFamily="49" charset="0"/>
-                <a:cs typeface="Courier New" pitchFamily="49" charset="0"/>
-              </a:rPr>
-              <a:t>            </a:t>
-            </a:r>
-            <a:r>
-              <a:rPr lang="en-US" sz="1400" dirty="0" err="1" smtClean="0">
-                <a:solidFill>
-                  <a:srgbClr val="000000"/>
-                </a:solidFill>
-                <a:latin typeface="Courier New" pitchFamily="49" charset="0"/>
-                <a:cs typeface="Courier New" pitchFamily="49" charset="0"/>
-              </a:rPr>
-              <a:t>numpy.testing.assert_array_almost_equal</a:t>
-            </a:r>
-            <a:r>
-              <a:rPr lang="en-US" sz="1400" dirty="0" smtClean="0">
-                <a:solidFill>
-                  <a:srgbClr val="000000"/>
-                </a:solidFill>
-                <a:latin typeface="Courier New" pitchFamily="49" charset="0"/>
-                <a:cs typeface="Courier New" pitchFamily="49" charset="0"/>
-              </a:rPr>
-              <a:t>(variance, expected, </a:t>
-            </a:r>
-            <a:r>
-              <a:rPr lang="en-US" sz="1400" dirty="0" smtClean="0">
-                <a:solidFill>
-                  <a:srgbClr val="800000"/>
-                </a:solidFill>
-                <a:latin typeface="Courier New" pitchFamily="49" charset="0"/>
-                <a:cs typeface="Courier New" pitchFamily="49" charset="0"/>
-              </a:rPr>
-              <a:t>1</a:t>
-            </a:r>
-            <a:r>
-              <a:rPr lang="en-US" sz="1400" dirty="0" smtClean="0">
-                <a:solidFill>
-                  <a:srgbClr val="000000"/>
-                </a:solidFill>
-                <a:latin typeface="Courier New" pitchFamily="49" charset="0"/>
-                <a:cs typeface="Courier New" pitchFamily="49" charset="0"/>
-              </a:rPr>
-              <a:t>)</a:t>
+              <a:t>            numpy.testing.assert_array_almost_equal(variance, expected, 1)</a:t>
             </a:r>
           </a:p>
           <a:p>
@@ -51986,6 +51685,13 @@
   <p:clrMapOvr>
     <a:masterClrMapping/>
   </p:clrMapOvr>
+  <p:timing>
+    <p:tnLst>
+      <p:par>
+        <p:cTn xmlns:p14="http://schemas.microsoft.com/office/powerpoint/2010/main" id="1" dur="indefinite" restart="never" nodeType="tmRoot"/>
+      </p:par>
+    </p:tnLst>
+  </p:timing>
 </p:sld>
 </file>
 

</xml_diff>

<commit_message>
Minor fixes of typos found during class.
</commit_message>
<xml_diff>
--- a/testing-debugging-profiling.pptx
+++ b/testing-debugging-profiling.pptx
@@ -6673,24 +6673,24 @@
   </dgm:ptLst>
   <dgm:cxnLst>
     <dgm:cxn modelId="{8747F884-7CA4-413D-AFAC-DD5CAE19DDA5}" srcId="{47AA4630-B738-4650-913F-7378CC40D312}" destId="{6CD60870-D228-4E7C-AB37-75604251742A}" srcOrd="2" destOrd="0" parTransId="{75E4D45F-C716-48A2-8E57-584BA67C4566}" sibTransId="{04BB66AA-DBE2-4BFD-A94E-A31165187E75}"/>
+    <dgm:cxn modelId="{B9FDB916-0E3A-45DF-B817-B4FF0DF0DD0F}" srcId="{47AA4630-B738-4650-913F-7378CC40D312}" destId="{96BC0EEB-57F0-4267-86F0-4EA98B40D230}" srcOrd="4" destOrd="0" parTransId="{A57BE1BC-E807-47AE-8640-A3F276768BED}" sibTransId="{062036D4-7094-47BF-9BE9-A58B2E6A4D41}"/>
     <dgm:cxn modelId="{D502F2CB-B89C-E34F-A6DF-89B1A25FEDE7}" type="presOf" srcId="{D8FC48C4-469B-40DC-950F-ABA168836D34}" destId="{3725F2C1-AA1D-49A3-9D73-9D444D08CE71}" srcOrd="0" destOrd="0" presId="urn:microsoft.com/office/officeart/2005/8/layout/process2"/>
-    <dgm:cxn modelId="{B9FDB916-0E3A-45DF-B817-B4FF0DF0DD0F}" srcId="{47AA4630-B738-4650-913F-7378CC40D312}" destId="{96BC0EEB-57F0-4267-86F0-4EA98B40D230}" srcOrd="4" destOrd="0" parTransId="{A57BE1BC-E807-47AE-8640-A3F276768BED}" sibTransId="{062036D4-7094-47BF-9BE9-A58B2E6A4D41}"/>
+    <dgm:cxn modelId="{CF6FC7B7-1ABC-5A44-B057-88C52247DFDB}" type="presOf" srcId="{6CD60870-D228-4E7C-AB37-75604251742A}" destId="{3FA6B472-D1F3-409B-BF18-F1310278CB78}" srcOrd="0" destOrd="0" presId="urn:microsoft.com/office/officeart/2005/8/layout/process2"/>
+    <dgm:cxn modelId="{0F95B477-3571-3442-BE80-0888F825957B}" srcId="{47AA4630-B738-4650-913F-7378CC40D312}" destId="{E188BD28-8BF3-DF4E-89B0-D0D9BDDAD858}" srcOrd="0" destOrd="0" parTransId="{36E39B49-FFE1-4141-AC7D-DEC0690E85F8}" sibTransId="{7764EA43-B182-BC4F-BCDA-333200F918B8}"/>
+    <dgm:cxn modelId="{FA0C0E2A-C034-524E-B609-3005A3507C7A}" type="presOf" srcId="{04BB66AA-DBE2-4BFD-A94E-A31165187E75}" destId="{E202264D-36A3-408A-9050-7FBD30D2645C}" srcOrd="0" destOrd="0" presId="urn:microsoft.com/office/officeart/2005/8/layout/process2"/>
+    <dgm:cxn modelId="{298F934D-0BC7-3B4B-8998-C29A1E2FA2F5}" type="presOf" srcId="{CB49FD0C-9B39-4860-B781-669D9FC3FB40}" destId="{BD1FA95E-C45B-4671-BBAB-95DCE436E052}" srcOrd="1" destOrd="0" presId="urn:microsoft.com/office/officeart/2005/8/layout/process2"/>
+    <dgm:cxn modelId="{29DFC02F-6195-3043-8F91-015C50C4CEAE}" type="presOf" srcId="{7764EA43-B182-BC4F-BCDA-333200F918B8}" destId="{5EB7E61C-215B-AD45-8738-514EF8F5F4E5}" srcOrd="1" destOrd="0" presId="urn:microsoft.com/office/officeart/2005/8/layout/process2"/>
+    <dgm:cxn modelId="{3F4C1D19-41C5-5C46-AB27-79D2FA146B21}" type="presOf" srcId="{E188BD28-8BF3-DF4E-89B0-D0D9BDDAD858}" destId="{8B185A30-22C7-6840-8D3E-58B36EE38549}" srcOrd="0" destOrd="0" presId="urn:microsoft.com/office/officeart/2005/8/layout/process2"/>
+    <dgm:cxn modelId="{165AE32A-34E6-4032-86AF-87A045F8F59C}" srcId="{47AA4630-B738-4650-913F-7378CC40D312}" destId="{D8FC48C4-469B-40DC-950F-ABA168836D34}" srcOrd="3" destOrd="0" parTransId="{3B29C759-9861-4F5A-9C39-84993FBBD849}" sibTransId="{CB49FD0C-9B39-4860-B781-669D9FC3FB40}"/>
+    <dgm:cxn modelId="{D086F928-FE0E-4B47-8C13-5FF4984C9F9C}" type="presOf" srcId="{EFB1699C-C280-416C-B6B3-B9CB2E52EAA1}" destId="{143F6140-E7F1-4CCF-A9B1-524762512517}" srcOrd="0" destOrd="0" presId="urn:microsoft.com/office/officeart/2005/8/layout/process2"/>
+    <dgm:cxn modelId="{FF83F153-2D58-2E4E-B3E7-2B6600349125}" type="presOf" srcId="{04BB66AA-DBE2-4BFD-A94E-A31165187E75}" destId="{E3B3E849-56D6-49C5-932E-7B5B0F9F195C}" srcOrd="1" destOrd="0" presId="urn:microsoft.com/office/officeart/2005/8/layout/process2"/>
+    <dgm:cxn modelId="{B8E8490A-B09C-734B-A716-413F24EA4012}" type="presOf" srcId="{EFB1699C-C280-416C-B6B3-B9CB2E52EAA1}" destId="{B2BEE0C4-D8B2-432A-8CB1-C2162205DCA3}" srcOrd="1" destOrd="0" presId="urn:microsoft.com/office/officeart/2005/8/layout/process2"/>
+    <dgm:cxn modelId="{F91E15A7-C24F-4D74-8B1A-D7C0021B8888}" srcId="{47AA4630-B738-4650-913F-7378CC40D312}" destId="{97DB59AD-8506-4A74-BB78-BA533F4FB10F}" srcOrd="1" destOrd="0" parTransId="{E5F038C7-DBC4-490A-AAFB-6D151F9C0538}" sibTransId="{EFB1699C-C280-416C-B6B3-B9CB2E52EAA1}"/>
+    <dgm:cxn modelId="{4F77C843-7170-FB42-AD56-04C07B5BA200}" type="presOf" srcId="{96BC0EEB-57F0-4267-86F0-4EA98B40D230}" destId="{C45FEE31-6BF1-4E83-9497-1224D8F07991}" srcOrd="0" destOrd="0" presId="urn:microsoft.com/office/officeart/2005/8/layout/process2"/>
+    <dgm:cxn modelId="{9D8E6E91-508B-E540-99ED-C0D4895B5537}" type="presOf" srcId="{CB49FD0C-9B39-4860-B781-669D9FC3FB40}" destId="{B4CC5E68-BD20-49EE-86FA-E08541A3FE12}" srcOrd="0" destOrd="0" presId="urn:microsoft.com/office/officeart/2005/8/layout/process2"/>
+    <dgm:cxn modelId="{9ED44D31-D359-7A48-807F-414B7B57652D}" type="presOf" srcId="{47AA4630-B738-4650-913F-7378CC40D312}" destId="{7A234B30-A436-41B7-96D9-05CCC2F7ADDC}" srcOrd="0" destOrd="0" presId="urn:microsoft.com/office/officeart/2005/8/layout/process2"/>
     <dgm:cxn modelId="{1B5D7B5E-5E25-644F-BB4B-F1E7896D0731}" type="presOf" srcId="{97DB59AD-8506-4A74-BB78-BA533F4FB10F}" destId="{87C32DCB-D7CA-425A-A14D-DC1B34BAA990}" srcOrd="0" destOrd="0" presId="urn:microsoft.com/office/officeart/2005/8/layout/process2"/>
-    <dgm:cxn modelId="{D086F928-FE0E-4B47-8C13-5FF4984C9F9C}" type="presOf" srcId="{EFB1699C-C280-416C-B6B3-B9CB2E52EAA1}" destId="{143F6140-E7F1-4CCF-A9B1-524762512517}" srcOrd="0" destOrd="0" presId="urn:microsoft.com/office/officeart/2005/8/layout/process2"/>
-    <dgm:cxn modelId="{B8E8490A-B09C-734B-A716-413F24EA4012}" type="presOf" srcId="{EFB1699C-C280-416C-B6B3-B9CB2E52EAA1}" destId="{B2BEE0C4-D8B2-432A-8CB1-C2162205DCA3}" srcOrd="1" destOrd="0" presId="urn:microsoft.com/office/officeart/2005/8/layout/process2"/>
-    <dgm:cxn modelId="{9D8E6E91-508B-E540-99ED-C0D4895B5537}" type="presOf" srcId="{CB49FD0C-9B39-4860-B781-669D9FC3FB40}" destId="{B4CC5E68-BD20-49EE-86FA-E08541A3FE12}" srcOrd="0" destOrd="0" presId="urn:microsoft.com/office/officeart/2005/8/layout/process2"/>
-    <dgm:cxn modelId="{29DFC02F-6195-3043-8F91-015C50C4CEAE}" type="presOf" srcId="{7764EA43-B182-BC4F-BCDA-333200F918B8}" destId="{5EB7E61C-215B-AD45-8738-514EF8F5F4E5}" srcOrd="1" destOrd="0" presId="urn:microsoft.com/office/officeart/2005/8/layout/process2"/>
-    <dgm:cxn modelId="{F91E15A7-C24F-4D74-8B1A-D7C0021B8888}" srcId="{47AA4630-B738-4650-913F-7378CC40D312}" destId="{97DB59AD-8506-4A74-BB78-BA533F4FB10F}" srcOrd="1" destOrd="0" parTransId="{E5F038C7-DBC4-490A-AAFB-6D151F9C0538}" sibTransId="{EFB1699C-C280-416C-B6B3-B9CB2E52EAA1}"/>
     <dgm:cxn modelId="{9C518300-8071-B04B-8A6B-F7BFA0AC4999}" type="presOf" srcId="{7764EA43-B182-BC4F-BCDA-333200F918B8}" destId="{66533B70-8731-2345-9B98-5A7A7F80153B}" srcOrd="0" destOrd="0" presId="urn:microsoft.com/office/officeart/2005/8/layout/process2"/>
-    <dgm:cxn modelId="{FF83F153-2D58-2E4E-B3E7-2B6600349125}" type="presOf" srcId="{04BB66AA-DBE2-4BFD-A94E-A31165187E75}" destId="{E3B3E849-56D6-49C5-932E-7B5B0F9F195C}" srcOrd="1" destOrd="0" presId="urn:microsoft.com/office/officeart/2005/8/layout/process2"/>
-    <dgm:cxn modelId="{0F95B477-3571-3442-BE80-0888F825957B}" srcId="{47AA4630-B738-4650-913F-7378CC40D312}" destId="{E188BD28-8BF3-DF4E-89B0-D0D9BDDAD858}" srcOrd="0" destOrd="0" parTransId="{36E39B49-FFE1-4141-AC7D-DEC0690E85F8}" sibTransId="{7764EA43-B182-BC4F-BCDA-333200F918B8}"/>
-    <dgm:cxn modelId="{3F4C1D19-41C5-5C46-AB27-79D2FA146B21}" type="presOf" srcId="{E188BD28-8BF3-DF4E-89B0-D0D9BDDAD858}" destId="{8B185A30-22C7-6840-8D3E-58B36EE38549}" srcOrd="0" destOrd="0" presId="urn:microsoft.com/office/officeart/2005/8/layout/process2"/>
-    <dgm:cxn modelId="{298F934D-0BC7-3B4B-8998-C29A1E2FA2F5}" type="presOf" srcId="{CB49FD0C-9B39-4860-B781-669D9FC3FB40}" destId="{BD1FA95E-C45B-4671-BBAB-95DCE436E052}" srcOrd="1" destOrd="0" presId="urn:microsoft.com/office/officeart/2005/8/layout/process2"/>
-    <dgm:cxn modelId="{4F77C843-7170-FB42-AD56-04C07B5BA200}" type="presOf" srcId="{96BC0EEB-57F0-4267-86F0-4EA98B40D230}" destId="{C45FEE31-6BF1-4E83-9497-1224D8F07991}" srcOrd="0" destOrd="0" presId="urn:microsoft.com/office/officeart/2005/8/layout/process2"/>
-    <dgm:cxn modelId="{165AE32A-34E6-4032-86AF-87A045F8F59C}" srcId="{47AA4630-B738-4650-913F-7378CC40D312}" destId="{D8FC48C4-469B-40DC-950F-ABA168836D34}" srcOrd="3" destOrd="0" parTransId="{3B29C759-9861-4F5A-9C39-84993FBBD849}" sibTransId="{CB49FD0C-9B39-4860-B781-669D9FC3FB40}"/>
-    <dgm:cxn modelId="{CF6FC7B7-1ABC-5A44-B057-88C52247DFDB}" type="presOf" srcId="{6CD60870-D228-4E7C-AB37-75604251742A}" destId="{3FA6B472-D1F3-409B-BF18-F1310278CB78}" srcOrd="0" destOrd="0" presId="urn:microsoft.com/office/officeart/2005/8/layout/process2"/>
-    <dgm:cxn modelId="{9ED44D31-D359-7A48-807F-414B7B57652D}" type="presOf" srcId="{47AA4630-B738-4650-913F-7378CC40D312}" destId="{7A234B30-A436-41B7-96D9-05CCC2F7ADDC}" srcOrd="0" destOrd="0" presId="urn:microsoft.com/office/officeart/2005/8/layout/process2"/>
-    <dgm:cxn modelId="{FA0C0E2A-C034-524E-B609-3005A3507C7A}" type="presOf" srcId="{04BB66AA-DBE2-4BFD-A94E-A31165187E75}" destId="{E202264D-36A3-408A-9050-7FBD30D2645C}" srcOrd="0" destOrd="0" presId="urn:microsoft.com/office/officeart/2005/8/layout/process2"/>
     <dgm:cxn modelId="{D10CBB14-61D0-5A4C-9A50-E26F9C5EB347}" type="presParOf" srcId="{7A234B30-A436-41B7-96D9-05CCC2F7ADDC}" destId="{8B185A30-22C7-6840-8D3E-58B36EE38549}" srcOrd="0" destOrd="0" presId="urn:microsoft.com/office/officeart/2005/8/layout/process2"/>
     <dgm:cxn modelId="{8FE40D00-E814-1443-BEB0-B3CC291F595A}" type="presParOf" srcId="{7A234B30-A436-41B7-96D9-05CCC2F7ADDC}" destId="{66533B70-8731-2345-9B98-5A7A7F80153B}" srcOrd="1" destOrd="0" presId="urn:microsoft.com/office/officeart/2005/8/layout/process2"/>
     <dgm:cxn modelId="{A24DEC56-1878-E64B-9D73-E456A25FB8B9}" type="presParOf" srcId="{66533B70-8731-2345-9B98-5A7A7F80153B}" destId="{5EB7E61C-215B-AD45-8738-514EF8F5F4E5}" srcOrd="0" destOrd="0" presId="urn:microsoft.com/office/officeart/2005/8/layout/process2"/>
@@ -7867,24 +7867,24 @@
   </dgm:ptLst>
   <dgm:cxnLst>
     <dgm:cxn modelId="{8747F884-7CA4-413D-AFAC-DD5CAE19DDA5}" srcId="{47AA4630-B738-4650-913F-7378CC40D312}" destId="{6CD60870-D228-4E7C-AB37-75604251742A}" srcOrd="2" destOrd="0" parTransId="{75E4D45F-C716-48A2-8E57-584BA67C4566}" sibTransId="{04BB66AA-DBE2-4BFD-A94E-A31165187E75}"/>
+    <dgm:cxn modelId="{B9FDB916-0E3A-45DF-B817-B4FF0DF0DD0F}" srcId="{47AA4630-B738-4650-913F-7378CC40D312}" destId="{96BC0EEB-57F0-4267-86F0-4EA98B40D230}" srcOrd="4" destOrd="0" parTransId="{A57BE1BC-E807-47AE-8640-A3F276768BED}" sibTransId="{062036D4-7094-47BF-9BE9-A58B2E6A4D41}"/>
+    <dgm:cxn modelId="{F4F8E3FF-6FD5-6745-A94E-2A3A6F209DFF}" type="presOf" srcId="{CB49FD0C-9B39-4860-B781-669D9FC3FB40}" destId="{BD1FA95E-C45B-4671-BBAB-95DCE436E052}" srcOrd="1" destOrd="0" presId="urn:microsoft.com/office/officeart/2005/8/layout/process2"/>
+    <dgm:cxn modelId="{0E210A85-09CF-AA45-A9A9-05D250FD2536}" type="presOf" srcId="{E188BD28-8BF3-DF4E-89B0-D0D9BDDAD858}" destId="{8B185A30-22C7-6840-8D3E-58B36EE38549}" srcOrd="0" destOrd="0" presId="urn:microsoft.com/office/officeart/2005/8/layout/process2"/>
+    <dgm:cxn modelId="{F91E15A7-C24F-4D74-8B1A-D7C0021B8888}" srcId="{47AA4630-B738-4650-913F-7378CC40D312}" destId="{97DB59AD-8506-4A74-BB78-BA533F4FB10F}" srcOrd="1" destOrd="0" parTransId="{E5F038C7-DBC4-490A-AAFB-6D151F9C0538}" sibTransId="{EFB1699C-C280-416C-B6B3-B9CB2E52EAA1}"/>
+    <dgm:cxn modelId="{53D6E192-6B91-4748-A7C9-998CF3DA9B64}" type="presOf" srcId="{CB49FD0C-9B39-4860-B781-669D9FC3FB40}" destId="{B4CC5E68-BD20-49EE-86FA-E08541A3FE12}" srcOrd="0" destOrd="0" presId="urn:microsoft.com/office/officeart/2005/8/layout/process2"/>
+    <dgm:cxn modelId="{E40B25C4-5FF1-D246-9715-8E798430839E}" type="presOf" srcId="{7764EA43-B182-BC4F-BCDA-333200F918B8}" destId="{66533B70-8731-2345-9B98-5A7A7F80153B}" srcOrd="0" destOrd="0" presId="urn:microsoft.com/office/officeart/2005/8/layout/process2"/>
+    <dgm:cxn modelId="{0F95B477-3571-3442-BE80-0888F825957B}" srcId="{47AA4630-B738-4650-913F-7378CC40D312}" destId="{E188BD28-8BF3-DF4E-89B0-D0D9BDDAD858}" srcOrd="0" destOrd="0" parTransId="{36E39B49-FFE1-4141-AC7D-DEC0690E85F8}" sibTransId="{7764EA43-B182-BC4F-BCDA-333200F918B8}"/>
+    <dgm:cxn modelId="{2D0ABAC6-DA91-8D46-B554-E9457DCF3A92}" type="presOf" srcId="{47AA4630-B738-4650-913F-7378CC40D312}" destId="{7A234B30-A436-41B7-96D9-05CCC2F7ADDC}" srcOrd="0" destOrd="0" presId="urn:microsoft.com/office/officeart/2005/8/layout/process2"/>
+    <dgm:cxn modelId="{3E1261D4-078C-EE4B-AFC6-897F3D5D71BD}" type="presOf" srcId="{EFB1699C-C280-416C-B6B3-B9CB2E52EAA1}" destId="{B2BEE0C4-D8B2-432A-8CB1-C2162205DCA3}" srcOrd="1" destOrd="0" presId="urn:microsoft.com/office/officeart/2005/8/layout/process2"/>
+    <dgm:cxn modelId="{EB39C2AD-FD57-5049-B098-258DD88E7496}" type="presOf" srcId="{04BB66AA-DBE2-4BFD-A94E-A31165187E75}" destId="{E202264D-36A3-408A-9050-7FBD30D2645C}" srcOrd="0" destOrd="0" presId="urn:microsoft.com/office/officeart/2005/8/layout/process2"/>
+    <dgm:cxn modelId="{165AE32A-34E6-4032-86AF-87A045F8F59C}" srcId="{47AA4630-B738-4650-913F-7378CC40D312}" destId="{D8FC48C4-469B-40DC-950F-ABA168836D34}" srcOrd="3" destOrd="0" parTransId="{3B29C759-9861-4F5A-9C39-84993FBBD849}" sibTransId="{CB49FD0C-9B39-4860-B781-669D9FC3FB40}"/>
+    <dgm:cxn modelId="{9DF0477C-A764-8B4F-B772-DEA08EF5B2B1}" type="presOf" srcId="{D8FC48C4-469B-40DC-950F-ABA168836D34}" destId="{3725F2C1-AA1D-49A3-9D73-9D444D08CE71}" srcOrd="0" destOrd="0" presId="urn:microsoft.com/office/officeart/2005/8/layout/process2"/>
+    <dgm:cxn modelId="{33D39394-D06E-3C45-A948-C1FD1F42BE5D}" type="presOf" srcId="{6CD60870-D228-4E7C-AB37-75604251742A}" destId="{3FA6B472-D1F3-409B-BF18-F1310278CB78}" srcOrd="0" destOrd="0" presId="urn:microsoft.com/office/officeart/2005/8/layout/process2"/>
+    <dgm:cxn modelId="{D365E894-A5EB-1247-B4AA-97AE89C3B6F1}" type="presOf" srcId="{EFB1699C-C280-416C-B6B3-B9CB2E52EAA1}" destId="{143F6140-E7F1-4CCF-A9B1-524762512517}" srcOrd="0" destOrd="0" presId="urn:microsoft.com/office/officeart/2005/8/layout/process2"/>
+    <dgm:cxn modelId="{6689F0B5-F6D2-6146-A3CC-16A7F09ECD95}" type="presOf" srcId="{97DB59AD-8506-4A74-BB78-BA533F4FB10F}" destId="{87C32DCB-D7CA-425A-A14D-DC1B34BAA990}" srcOrd="0" destOrd="0" presId="urn:microsoft.com/office/officeart/2005/8/layout/process2"/>
+    <dgm:cxn modelId="{26575D07-F418-0F47-847E-EB1CD13E562B}" type="presOf" srcId="{96BC0EEB-57F0-4267-86F0-4EA98B40D230}" destId="{C45FEE31-6BF1-4E83-9497-1224D8F07991}" srcOrd="0" destOrd="0" presId="urn:microsoft.com/office/officeart/2005/8/layout/process2"/>
     <dgm:cxn modelId="{9DCAD1AE-AE8F-C542-993A-46832AD7E3F7}" type="presOf" srcId="{04BB66AA-DBE2-4BFD-A94E-A31165187E75}" destId="{E3B3E849-56D6-49C5-932E-7B5B0F9F195C}" srcOrd="1" destOrd="0" presId="urn:microsoft.com/office/officeart/2005/8/layout/process2"/>
-    <dgm:cxn modelId="{B9FDB916-0E3A-45DF-B817-B4FF0DF0DD0F}" srcId="{47AA4630-B738-4650-913F-7378CC40D312}" destId="{96BC0EEB-57F0-4267-86F0-4EA98B40D230}" srcOrd="4" destOrd="0" parTransId="{A57BE1BC-E807-47AE-8640-A3F276768BED}" sibTransId="{062036D4-7094-47BF-9BE9-A58B2E6A4D41}"/>
-    <dgm:cxn modelId="{6689F0B5-F6D2-6146-A3CC-16A7F09ECD95}" type="presOf" srcId="{97DB59AD-8506-4A74-BB78-BA533F4FB10F}" destId="{87C32DCB-D7CA-425A-A14D-DC1B34BAA990}" srcOrd="0" destOrd="0" presId="urn:microsoft.com/office/officeart/2005/8/layout/process2"/>
-    <dgm:cxn modelId="{EB39C2AD-FD57-5049-B098-258DD88E7496}" type="presOf" srcId="{04BB66AA-DBE2-4BFD-A94E-A31165187E75}" destId="{E202264D-36A3-408A-9050-7FBD30D2645C}" srcOrd="0" destOrd="0" presId="urn:microsoft.com/office/officeart/2005/8/layout/process2"/>
-    <dgm:cxn modelId="{0F95B477-3571-3442-BE80-0888F825957B}" srcId="{47AA4630-B738-4650-913F-7378CC40D312}" destId="{E188BD28-8BF3-DF4E-89B0-D0D9BDDAD858}" srcOrd="0" destOrd="0" parTransId="{36E39B49-FFE1-4141-AC7D-DEC0690E85F8}" sibTransId="{7764EA43-B182-BC4F-BCDA-333200F918B8}"/>
-    <dgm:cxn modelId="{F4F8E3FF-6FD5-6745-A94E-2A3A6F209DFF}" type="presOf" srcId="{CB49FD0C-9B39-4860-B781-669D9FC3FB40}" destId="{BD1FA95E-C45B-4671-BBAB-95DCE436E052}" srcOrd="1" destOrd="0" presId="urn:microsoft.com/office/officeart/2005/8/layout/process2"/>
-    <dgm:cxn modelId="{E40B25C4-5FF1-D246-9715-8E798430839E}" type="presOf" srcId="{7764EA43-B182-BC4F-BCDA-333200F918B8}" destId="{66533B70-8731-2345-9B98-5A7A7F80153B}" srcOrd="0" destOrd="0" presId="urn:microsoft.com/office/officeart/2005/8/layout/process2"/>
-    <dgm:cxn modelId="{165AE32A-34E6-4032-86AF-87A045F8F59C}" srcId="{47AA4630-B738-4650-913F-7378CC40D312}" destId="{D8FC48C4-469B-40DC-950F-ABA168836D34}" srcOrd="3" destOrd="0" parTransId="{3B29C759-9861-4F5A-9C39-84993FBBD849}" sibTransId="{CB49FD0C-9B39-4860-B781-669D9FC3FB40}"/>
     <dgm:cxn modelId="{258E6188-D24E-5243-86FE-FF33A3DEEA39}" type="presOf" srcId="{7764EA43-B182-BC4F-BCDA-333200F918B8}" destId="{5EB7E61C-215B-AD45-8738-514EF8F5F4E5}" srcOrd="1" destOrd="0" presId="urn:microsoft.com/office/officeart/2005/8/layout/process2"/>
-    <dgm:cxn modelId="{3E1261D4-078C-EE4B-AFC6-897F3D5D71BD}" type="presOf" srcId="{EFB1699C-C280-416C-B6B3-B9CB2E52EAA1}" destId="{B2BEE0C4-D8B2-432A-8CB1-C2162205DCA3}" srcOrd="1" destOrd="0" presId="urn:microsoft.com/office/officeart/2005/8/layout/process2"/>
-    <dgm:cxn modelId="{2D0ABAC6-DA91-8D46-B554-E9457DCF3A92}" type="presOf" srcId="{47AA4630-B738-4650-913F-7378CC40D312}" destId="{7A234B30-A436-41B7-96D9-05CCC2F7ADDC}" srcOrd="0" destOrd="0" presId="urn:microsoft.com/office/officeart/2005/8/layout/process2"/>
-    <dgm:cxn modelId="{D365E894-A5EB-1247-B4AA-97AE89C3B6F1}" type="presOf" srcId="{EFB1699C-C280-416C-B6B3-B9CB2E52EAA1}" destId="{143F6140-E7F1-4CCF-A9B1-524762512517}" srcOrd="0" destOrd="0" presId="urn:microsoft.com/office/officeart/2005/8/layout/process2"/>
-    <dgm:cxn modelId="{F91E15A7-C24F-4D74-8B1A-D7C0021B8888}" srcId="{47AA4630-B738-4650-913F-7378CC40D312}" destId="{97DB59AD-8506-4A74-BB78-BA533F4FB10F}" srcOrd="1" destOrd="0" parTransId="{E5F038C7-DBC4-490A-AAFB-6D151F9C0538}" sibTransId="{EFB1699C-C280-416C-B6B3-B9CB2E52EAA1}"/>
-    <dgm:cxn modelId="{9DF0477C-A764-8B4F-B772-DEA08EF5B2B1}" type="presOf" srcId="{D8FC48C4-469B-40DC-950F-ABA168836D34}" destId="{3725F2C1-AA1D-49A3-9D73-9D444D08CE71}" srcOrd="0" destOrd="0" presId="urn:microsoft.com/office/officeart/2005/8/layout/process2"/>
-    <dgm:cxn modelId="{26575D07-F418-0F47-847E-EB1CD13E562B}" type="presOf" srcId="{96BC0EEB-57F0-4267-86F0-4EA98B40D230}" destId="{C45FEE31-6BF1-4E83-9497-1224D8F07991}" srcOrd="0" destOrd="0" presId="urn:microsoft.com/office/officeart/2005/8/layout/process2"/>
-    <dgm:cxn modelId="{0E210A85-09CF-AA45-A9A9-05D250FD2536}" type="presOf" srcId="{E188BD28-8BF3-DF4E-89B0-D0D9BDDAD858}" destId="{8B185A30-22C7-6840-8D3E-58B36EE38549}" srcOrd="0" destOrd="0" presId="urn:microsoft.com/office/officeart/2005/8/layout/process2"/>
-    <dgm:cxn modelId="{33D39394-D06E-3C45-A948-C1FD1F42BE5D}" type="presOf" srcId="{6CD60870-D228-4E7C-AB37-75604251742A}" destId="{3FA6B472-D1F3-409B-BF18-F1310278CB78}" srcOrd="0" destOrd="0" presId="urn:microsoft.com/office/officeart/2005/8/layout/process2"/>
-    <dgm:cxn modelId="{53D6E192-6B91-4748-A7C9-998CF3DA9B64}" type="presOf" srcId="{CB49FD0C-9B39-4860-B781-669D9FC3FB40}" destId="{B4CC5E68-BD20-49EE-86FA-E08541A3FE12}" srcOrd="0" destOrd="0" presId="urn:microsoft.com/office/officeart/2005/8/layout/process2"/>
     <dgm:cxn modelId="{15EAEB83-C41B-5C48-9F6E-3898263890BB}" type="presParOf" srcId="{7A234B30-A436-41B7-96D9-05CCC2F7ADDC}" destId="{8B185A30-22C7-6840-8D3E-58B36EE38549}" srcOrd="0" destOrd="0" presId="urn:microsoft.com/office/officeart/2005/8/layout/process2"/>
     <dgm:cxn modelId="{D84D3A96-F045-B440-B21D-D8AE917A4A87}" type="presParOf" srcId="{7A234B30-A436-41B7-96D9-05CCC2F7ADDC}" destId="{66533B70-8731-2345-9B98-5A7A7F80153B}" srcOrd="1" destOrd="0" presId="urn:microsoft.com/office/officeart/2005/8/layout/process2"/>
     <dgm:cxn modelId="{7AFF4E44-A8A0-B346-A202-3F879C6FDA04}" type="presParOf" srcId="{66533B70-8731-2345-9B98-5A7A7F80153B}" destId="{5EB7E61C-215B-AD45-8738-514EF8F5F4E5}" srcOrd="0" destOrd="0" presId="urn:microsoft.com/office/officeart/2005/8/layout/process2"/>
@@ -11460,873 +11460,6 @@
       <dsp:cNvGrpSpPr/>
     </dsp:nvGrpSpPr>
     <dsp:grpSpPr/>
-    <dsp:sp modelId="{8B185A30-22C7-6840-8D3E-58B36EE38549}">
-      <dsp:nvSpPr>
-        <dsp:cNvPr id="0" name=""/>
-        <dsp:cNvSpPr/>
-      </dsp:nvSpPr>
-      <dsp:spPr>
-        <a:xfrm>
-          <a:off x="1716833" y="2920"/>
-          <a:ext cx="3781570" cy="682929"/>
-        </a:xfrm>
-        <a:prstGeom prst="roundRect">
-          <a:avLst>
-            <a:gd name="adj" fmla="val 10000"/>
-          </a:avLst>
-        </a:prstGeom>
-        <a:solidFill>
-          <a:schemeClr val="bg1"/>
-        </a:solidFill>
-        <a:ln w="38100" cmpd="sng">
-          <a:solidFill>
-            <a:srgbClr val="BFBFBF"/>
-          </a:solidFill>
-        </a:ln>
-        <a:effectLst/>
-        <a:scene3d>
-          <a:camera prst="orthographicFront" fov="0">
-            <a:rot lat="0" lon="0" rev="0"/>
-          </a:camera>
-          <a:lightRig rig="balanced" dir="t">
-            <a:rot lat="0" lon="0" rev="0"/>
-          </a:lightRig>
-        </a:scene3d>
-        <a:sp3d prstMaterial="matte">
-          <a:bevelT w="0" h="0"/>
-          <a:contourClr>
-            <a:scrgbClr r="0" g="0" b="0">
-              <a:tint val="100000"/>
-              <a:shade val="100000"/>
-              <a:hueMod val="100000"/>
-              <a:satMod val="100000"/>
-            </a:scrgbClr>
-          </a:contourClr>
-        </a:sp3d>
-      </dsp:spPr>
-      <dsp:style>
-        <a:lnRef idx="0">
-          <a:scrgbClr r="0" g="0" b="0"/>
-        </a:lnRef>
-        <a:fillRef idx="3">
-          <a:scrgbClr r="0" g="0" b="0"/>
-        </a:fillRef>
-        <a:effectRef idx="2">
-          <a:scrgbClr r="0" g="0" b="0"/>
-        </a:effectRef>
-        <a:fontRef idx="minor">
-          <a:schemeClr val="lt1"/>
-        </a:fontRef>
-      </dsp:style>
-      <dsp:txBody>
-        <a:bodyPr spcFirstLastPara="0" vert="horz" wrap="square" lIns="91440" tIns="91440" rIns="91440" bIns="91440" numCol="1" spcCol="1270" anchor="ctr" anchorCtr="0">
-          <a:noAutofit/>
-        </a:bodyPr>
-        <a:lstStyle/>
-        <a:p>
-          <a:pPr lvl="0" algn="ctr" defTabSz="1066800">
-            <a:lnSpc>
-              <a:spcPct val="90000"/>
-            </a:lnSpc>
-            <a:spcBef>
-              <a:spcPct val="0"/>
-            </a:spcBef>
-            <a:spcAft>
-              <a:spcPct val="35000"/>
-            </a:spcAft>
-          </a:pPr>
-          <a:r>
-            <a:rPr lang="en-GB" sz="2400" kern="1200" dirty="0">
-              <a:solidFill>
-                <a:srgbClr val="D9D9D9"/>
-              </a:solidFill>
-            </a:rPr>
-            <a:t>Pick your next feature</a:t>
-          </a:r>
-        </a:p>
-      </dsp:txBody>
-      <dsp:txXfrm>
-        <a:off x="1736835" y="22922"/>
-        <a:ext cx="3741566" cy="642925"/>
-      </dsp:txXfrm>
-    </dsp:sp>
-    <dsp:sp modelId="{66533B70-8731-2345-9B98-5A7A7F80153B}">
-      <dsp:nvSpPr>
-        <dsp:cNvPr id="0" name=""/>
-        <dsp:cNvSpPr/>
-      </dsp:nvSpPr>
-      <dsp:spPr>
-        <a:xfrm rot="5400000">
-          <a:off x="3479569" y="702923"/>
-          <a:ext cx="256098" cy="307318"/>
-        </a:xfrm>
-        <a:prstGeom prst="rightArrow">
-          <a:avLst>
-            <a:gd name="adj1" fmla="val 60000"/>
-            <a:gd name="adj2" fmla="val 50000"/>
-          </a:avLst>
-        </a:prstGeom>
-        <a:solidFill>
-          <a:srgbClr val="FFFFFF"/>
-        </a:solidFill>
-        <a:ln w="38100" cmpd="sng">
-          <a:solidFill>
-            <a:srgbClr val="BFBFBF"/>
-          </a:solidFill>
-        </a:ln>
-        <a:effectLst/>
-        <a:scene3d>
-          <a:camera prst="orthographicFront" fov="0">
-            <a:rot lat="0" lon="0" rev="0"/>
-          </a:camera>
-          <a:lightRig rig="balanced" dir="t">
-            <a:rot lat="0" lon="0" rev="0"/>
-          </a:lightRig>
-        </a:scene3d>
-        <a:sp3d prstMaterial="matte">
-          <a:bevelT w="0" h="0"/>
-          <a:contourClr>
-            <a:scrgbClr r="0" g="0" b="0">
-              <a:tint val="100000"/>
-              <a:shade val="100000"/>
-              <a:hueMod val="100000"/>
-              <a:satMod val="100000"/>
-            </a:scrgbClr>
-          </a:contourClr>
-        </a:sp3d>
-      </dsp:spPr>
-      <dsp:style>
-        <a:lnRef idx="0">
-          <a:scrgbClr r="0" g="0" b="0"/>
-        </a:lnRef>
-        <a:fillRef idx="3">
-          <a:scrgbClr r="0" g="0" b="0"/>
-        </a:fillRef>
-        <a:effectRef idx="2">
-          <a:scrgbClr r="0" g="0" b="0"/>
-        </a:effectRef>
-        <a:fontRef idx="minor">
-          <a:schemeClr val="lt1"/>
-        </a:fontRef>
-      </dsp:style>
-      <dsp:txBody>
-        <a:bodyPr spcFirstLastPara="0" vert="horz" wrap="square" lIns="0" tIns="0" rIns="0" bIns="0" numCol="1" spcCol="1270" anchor="ctr" anchorCtr="0">
-          <a:noAutofit/>
-        </a:bodyPr>
-        <a:lstStyle/>
-        <a:p>
-          <a:pPr lvl="0" algn="ctr" defTabSz="488950">
-            <a:lnSpc>
-              <a:spcPct val="90000"/>
-            </a:lnSpc>
-            <a:spcBef>
-              <a:spcPct val="0"/>
-            </a:spcBef>
-            <a:spcAft>
-              <a:spcPct val="35000"/>
-            </a:spcAft>
-          </a:pPr>
-          <a:endParaRPr lang="en-US" sz="1100" kern="1200"/>
-        </a:p>
-      </dsp:txBody>
-      <dsp:txXfrm rot="-5400000">
-        <a:off x="3515424" y="728533"/>
-        <a:ext cx="184390" cy="179269"/>
-      </dsp:txXfrm>
-    </dsp:sp>
-    <dsp:sp modelId="{87C32DCB-D7CA-425A-A14D-DC1B34BAA990}">
-      <dsp:nvSpPr>
-        <dsp:cNvPr id="0" name=""/>
-        <dsp:cNvSpPr/>
-      </dsp:nvSpPr>
-      <dsp:spPr>
-        <a:xfrm>
-          <a:off x="1681977" y="1027314"/>
-          <a:ext cx="3851283" cy="682929"/>
-        </a:xfrm>
-        <a:prstGeom prst="roundRect">
-          <a:avLst>
-            <a:gd name="adj" fmla="val 10000"/>
-          </a:avLst>
-        </a:prstGeom>
-        <a:solidFill>
-          <a:srgbClr val="FFFFFF"/>
-        </a:solidFill>
-        <a:ln w="38100" cmpd="sng">
-          <a:solidFill>
-            <a:srgbClr val="BFBFBF"/>
-          </a:solidFill>
-        </a:ln>
-        <a:effectLst/>
-        <a:scene3d>
-          <a:camera prst="orthographicFront" fov="0">
-            <a:rot lat="0" lon="0" rev="0"/>
-          </a:camera>
-          <a:lightRig rig="balanced" dir="t">
-            <a:rot lat="0" lon="0" rev="0"/>
-          </a:lightRig>
-        </a:scene3d>
-        <a:sp3d prstMaterial="matte">
-          <a:bevelT w="0" h="0"/>
-          <a:contourClr>
-            <a:scrgbClr r="0" g="0" b="0">
-              <a:tint val="100000"/>
-              <a:shade val="100000"/>
-              <a:hueMod val="100000"/>
-              <a:satMod val="100000"/>
-            </a:scrgbClr>
-          </a:contourClr>
-        </a:sp3d>
-      </dsp:spPr>
-      <dsp:style>
-        <a:lnRef idx="0">
-          <a:scrgbClr r="0" g="0" b="0"/>
-        </a:lnRef>
-        <a:fillRef idx="3">
-          <a:scrgbClr r="0" g="0" b="0"/>
-        </a:fillRef>
-        <a:effectRef idx="2">
-          <a:scrgbClr r="0" g="0" b="0"/>
-        </a:effectRef>
-        <a:fontRef idx="minor">
-          <a:schemeClr val="lt1"/>
-        </a:fontRef>
-      </dsp:style>
-      <dsp:txBody>
-        <a:bodyPr spcFirstLastPara="0" vert="horz" wrap="square" lIns="91440" tIns="91440" rIns="91440" bIns="91440" numCol="1" spcCol="1270" anchor="ctr" anchorCtr="0">
-          <a:noAutofit/>
-        </a:bodyPr>
-        <a:lstStyle/>
-        <a:p>
-          <a:pPr lvl="0" algn="ctr" defTabSz="1066800">
-            <a:lnSpc>
-              <a:spcPct val="90000"/>
-            </a:lnSpc>
-            <a:spcBef>
-              <a:spcPct val="0"/>
-            </a:spcBef>
-            <a:spcAft>
-              <a:spcPct val="35000"/>
-            </a:spcAft>
-          </a:pPr>
-          <a:r>
-            <a:rPr lang="en-US" sz="2400" kern="1200" dirty="0" smtClean="0">
-              <a:solidFill>
-                <a:srgbClr val="D9D9D9"/>
-              </a:solidFill>
-            </a:rPr>
-            <a:t>Write tests </a:t>
-          </a:r>
-          <a:br>
-            <a:rPr lang="en-US" sz="2400" kern="1200" dirty="0" smtClean="0">
-              <a:solidFill>
-                <a:srgbClr val="D9D9D9"/>
-              </a:solidFill>
-            </a:rPr>
-          </a:br>
-          <a:r>
-            <a:rPr lang="en-US" sz="2000" kern="1200" dirty="0" smtClean="0">
-              <a:solidFill>
-                <a:srgbClr val="D9D9D9"/>
-              </a:solidFill>
-            </a:rPr>
-            <a:t>to check that feature works </a:t>
-          </a:r>
-          <a:endParaRPr lang="en-GB" sz="2400" kern="1200" dirty="0">
-            <a:solidFill>
-              <a:srgbClr val="D9D9D9"/>
-            </a:solidFill>
-          </a:endParaRPr>
-        </a:p>
-      </dsp:txBody>
-      <dsp:txXfrm>
-        <a:off x="1701979" y="1047316"/>
-        <a:ext cx="3811279" cy="642925"/>
-      </dsp:txXfrm>
-    </dsp:sp>
-    <dsp:sp modelId="{143F6140-E7F1-4CCF-A9B1-524762512517}">
-      <dsp:nvSpPr>
-        <dsp:cNvPr id="0" name=""/>
-        <dsp:cNvSpPr/>
-      </dsp:nvSpPr>
-      <dsp:spPr>
-        <a:xfrm rot="5400000">
-          <a:off x="3479569" y="1727317"/>
-          <a:ext cx="256098" cy="307318"/>
-        </a:xfrm>
-        <a:prstGeom prst="rightArrow">
-          <a:avLst>
-            <a:gd name="adj1" fmla="val 60000"/>
-            <a:gd name="adj2" fmla="val 50000"/>
-          </a:avLst>
-        </a:prstGeom>
-        <a:solidFill>
-          <a:srgbClr val="FFFFFF"/>
-        </a:solidFill>
-        <a:ln w="38100" cmpd="sng">
-          <a:solidFill>
-            <a:srgbClr val="BFBFBF"/>
-          </a:solidFill>
-        </a:ln>
-        <a:effectLst/>
-        <a:scene3d>
-          <a:camera prst="orthographicFront" fov="0">
-            <a:rot lat="0" lon="0" rev="0"/>
-          </a:camera>
-          <a:lightRig rig="balanced" dir="t">
-            <a:rot lat="0" lon="0" rev="0"/>
-          </a:lightRig>
-        </a:scene3d>
-        <a:sp3d prstMaterial="matte">
-          <a:bevelT w="0" h="0"/>
-          <a:contourClr>
-            <a:scrgbClr r="0" g="0" b="0">
-              <a:tint val="100000"/>
-              <a:shade val="100000"/>
-              <a:hueMod val="100000"/>
-              <a:satMod val="100000"/>
-            </a:scrgbClr>
-          </a:contourClr>
-        </a:sp3d>
-      </dsp:spPr>
-      <dsp:style>
-        <a:lnRef idx="0">
-          <a:scrgbClr r="0" g="0" b="0"/>
-        </a:lnRef>
-        <a:fillRef idx="3">
-          <a:scrgbClr r="0" g="0" b="0"/>
-        </a:fillRef>
-        <a:effectRef idx="2">
-          <a:scrgbClr r="0" g="0" b="0"/>
-        </a:effectRef>
-        <a:fontRef idx="minor">
-          <a:schemeClr val="lt1"/>
-        </a:fontRef>
-      </dsp:style>
-      <dsp:txBody>
-        <a:bodyPr spcFirstLastPara="0" vert="horz" wrap="square" lIns="0" tIns="0" rIns="0" bIns="0" numCol="1" spcCol="1270" anchor="ctr" anchorCtr="0">
-          <a:noAutofit/>
-        </a:bodyPr>
-        <a:lstStyle/>
-        <a:p>
-          <a:pPr lvl="0" algn="ctr" defTabSz="889000">
-            <a:lnSpc>
-              <a:spcPct val="90000"/>
-            </a:lnSpc>
-            <a:spcBef>
-              <a:spcPct val="0"/>
-            </a:spcBef>
-            <a:spcAft>
-              <a:spcPct val="35000"/>
-            </a:spcAft>
-          </a:pPr>
-          <a:endParaRPr lang="en-GB" sz="2000" kern="1200"/>
-        </a:p>
-      </dsp:txBody>
-      <dsp:txXfrm rot="-5400000">
-        <a:off x="3515424" y="1752927"/>
-        <a:ext cx="184390" cy="179269"/>
-      </dsp:txXfrm>
-    </dsp:sp>
-    <dsp:sp modelId="{3FA6B472-D1F3-409B-BF18-F1310278CB78}">
-      <dsp:nvSpPr>
-        <dsp:cNvPr id="0" name=""/>
-        <dsp:cNvSpPr/>
-      </dsp:nvSpPr>
-      <dsp:spPr>
-        <a:xfrm>
-          <a:off x="1697179" y="2051708"/>
-          <a:ext cx="3820879" cy="682929"/>
-        </a:xfrm>
-        <a:prstGeom prst="roundRect">
-          <a:avLst>
-            <a:gd name="adj" fmla="val 10000"/>
-          </a:avLst>
-        </a:prstGeom>
-        <a:solidFill>
-          <a:srgbClr val="FFFFFF"/>
-        </a:solidFill>
-        <a:ln w="38100" cmpd="sng">
-          <a:solidFill>
-            <a:srgbClr val="0ECC00"/>
-          </a:solidFill>
-        </a:ln>
-        <a:effectLst/>
-        <a:scene3d>
-          <a:camera prst="orthographicFront" fov="0">
-            <a:rot lat="0" lon="0" rev="0"/>
-          </a:camera>
-          <a:lightRig rig="balanced" dir="t">
-            <a:rot lat="0" lon="0" rev="0"/>
-          </a:lightRig>
-        </a:scene3d>
-        <a:sp3d prstMaterial="matte">
-          <a:bevelT w="0" h="0"/>
-          <a:contourClr>
-            <a:scrgbClr r="0" g="0" b="0">
-              <a:tint val="100000"/>
-              <a:shade val="100000"/>
-              <a:hueMod val="100000"/>
-              <a:satMod val="100000"/>
-            </a:scrgbClr>
-          </a:contourClr>
-        </a:sp3d>
-      </dsp:spPr>
-      <dsp:style>
-        <a:lnRef idx="0">
-          <a:scrgbClr r="0" g="0" b="0"/>
-        </a:lnRef>
-        <a:fillRef idx="3">
-          <a:scrgbClr r="0" g="0" b="0"/>
-        </a:fillRef>
-        <a:effectRef idx="2">
-          <a:scrgbClr r="0" g="0" b="0"/>
-        </a:effectRef>
-        <a:fontRef idx="minor">
-          <a:schemeClr val="lt1"/>
-        </a:fontRef>
-      </dsp:style>
-      <dsp:txBody>
-        <a:bodyPr spcFirstLastPara="0" vert="horz" wrap="square" lIns="91440" tIns="91440" rIns="91440" bIns="91440" numCol="1" spcCol="1270" anchor="ctr" anchorCtr="0">
-          <a:noAutofit/>
-        </a:bodyPr>
-        <a:lstStyle/>
-        <a:p>
-          <a:pPr lvl="0" algn="ctr" defTabSz="1066800">
-            <a:lnSpc>
-              <a:spcPct val="90000"/>
-            </a:lnSpc>
-            <a:spcBef>
-              <a:spcPct val="0"/>
-            </a:spcBef>
-            <a:spcAft>
-              <a:spcPct val="35000"/>
-            </a:spcAft>
-          </a:pPr>
-          <a:r>
-            <a:rPr lang="en-US" sz="2400" kern="1200" dirty="0" smtClean="0">
-              <a:solidFill>
-                <a:srgbClr val="000000"/>
-              </a:solidFill>
-            </a:rPr>
-            <a:t>Write simplest code </a:t>
-          </a:r>
-          <a:br>
-            <a:rPr lang="en-US" sz="2400" kern="1200" dirty="0" smtClean="0">
-              <a:solidFill>
-                <a:srgbClr val="000000"/>
-              </a:solidFill>
-            </a:rPr>
-          </a:br>
-          <a:r>
-            <a:rPr lang="en-US" sz="2000" kern="1200" dirty="0" smtClean="0">
-              <a:solidFill>
-                <a:srgbClr val="000000"/>
-              </a:solidFill>
-            </a:rPr>
-            <a:t>that makes tests pass</a:t>
-          </a:r>
-        </a:p>
-      </dsp:txBody>
-      <dsp:txXfrm>
-        <a:off x="1717181" y="2071710"/>
-        <a:ext cx="3780875" cy="642925"/>
-      </dsp:txXfrm>
-    </dsp:sp>
-    <dsp:sp modelId="{E202264D-36A3-408A-9050-7FBD30D2645C}">
-      <dsp:nvSpPr>
-        <dsp:cNvPr id="0" name=""/>
-        <dsp:cNvSpPr/>
-      </dsp:nvSpPr>
-      <dsp:spPr>
-        <a:xfrm rot="5400000">
-          <a:off x="3479569" y="2751710"/>
-          <a:ext cx="256098" cy="307318"/>
-        </a:xfrm>
-        <a:prstGeom prst="rightArrow">
-          <a:avLst>
-            <a:gd name="adj1" fmla="val 60000"/>
-            <a:gd name="adj2" fmla="val 50000"/>
-          </a:avLst>
-        </a:prstGeom>
-        <a:solidFill>
-          <a:srgbClr val="FFFFFF"/>
-        </a:solidFill>
-        <a:ln w="38100" cmpd="sng">
-          <a:solidFill>
-            <a:srgbClr val="BFBFBF"/>
-          </a:solidFill>
-        </a:ln>
-        <a:effectLst/>
-        <a:scene3d>
-          <a:camera prst="orthographicFront" fov="0">
-            <a:rot lat="0" lon="0" rev="0"/>
-          </a:camera>
-          <a:lightRig rig="balanced" dir="t">
-            <a:rot lat="0" lon="0" rev="0"/>
-          </a:lightRig>
-        </a:scene3d>
-        <a:sp3d prstMaterial="matte">
-          <a:bevelT w="0" h="0"/>
-          <a:contourClr>
-            <a:scrgbClr r="0" g="0" b="0">
-              <a:tint val="100000"/>
-              <a:shade val="100000"/>
-              <a:hueMod val="100000"/>
-              <a:satMod val="100000"/>
-            </a:scrgbClr>
-          </a:contourClr>
-        </a:sp3d>
-      </dsp:spPr>
-      <dsp:style>
-        <a:lnRef idx="0">
-          <a:scrgbClr r="0" g="0" b="0"/>
-        </a:lnRef>
-        <a:fillRef idx="3">
-          <a:scrgbClr r="0" g="0" b="0"/>
-        </a:fillRef>
-        <a:effectRef idx="2">
-          <a:scrgbClr r="0" g="0" b="0"/>
-        </a:effectRef>
-        <a:fontRef idx="minor">
-          <a:schemeClr val="lt1"/>
-        </a:fontRef>
-      </dsp:style>
-      <dsp:txBody>
-        <a:bodyPr spcFirstLastPara="0" vert="horz" wrap="square" lIns="0" tIns="0" rIns="0" bIns="0" numCol="1" spcCol="1270" anchor="ctr" anchorCtr="0">
-          <a:noAutofit/>
-        </a:bodyPr>
-        <a:lstStyle/>
-        <a:p>
-          <a:pPr lvl="0" algn="ctr" defTabSz="889000">
-            <a:lnSpc>
-              <a:spcPct val="90000"/>
-            </a:lnSpc>
-            <a:spcBef>
-              <a:spcPct val="0"/>
-            </a:spcBef>
-            <a:spcAft>
-              <a:spcPct val="35000"/>
-            </a:spcAft>
-          </a:pPr>
-          <a:endParaRPr lang="en-GB" sz="2000" kern="1200"/>
-        </a:p>
-      </dsp:txBody>
-      <dsp:txXfrm rot="-5400000">
-        <a:off x="3515424" y="2777320"/>
-        <a:ext cx="184390" cy="179269"/>
-      </dsp:txXfrm>
-    </dsp:sp>
-    <dsp:sp modelId="{3725F2C1-AA1D-49A3-9D73-9D444D08CE71}">
-      <dsp:nvSpPr>
-        <dsp:cNvPr id="0" name=""/>
-        <dsp:cNvSpPr/>
-      </dsp:nvSpPr>
-      <dsp:spPr>
-        <a:xfrm>
-          <a:off x="1697179" y="3076102"/>
-          <a:ext cx="3820879" cy="682929"/>
-        </a:xfrm>
-        <a:prstGeom prst="roundRect">
-          <a:avLst>
-            <a:gd name="adj" fmla="val 10000"/>
-          </a:avLst>
-        </a:prstGeom>
-        <a:solidFill>
-          <a:srgbClr val="FFFFFF"/>
-        </a:solidFill>
-        <a:ln w="38100" cmpd="sng">
-          <a:solidFill>
-            <a:srgbClr val="BFBFBF"/>
-          </a:solidFill>
-        </a:ln>
-        <a:effectLst/>
-        <a:scene3d>
-          <a:camera prst="orthographicFront" fov="0">
-            <a:rot lat="0" lon="0" rev="0"/>
-          </a:camera>
-          <a:lightRig rig="balanced" dir="t">
-            <a:rot lat="0" lon="0" rev="0"/>
-          </a:lightRig>
-        </a:scene3d>
-        <a:sp3d prstMaterial="matte">
-          <a:bevelT w="0" h="0"/>
-          <a:contourClr>
-            <a:scrgbClr r="0" g="0" b="0">
-              <a:tint val="100000"/>
-              <a:shade val="100000"/>
-              <a:hueMod val="100000"/>
-              <a:satMod val="100000"/>
-            </a:scrgbClr>
-          </a:contourClr>
-        </a:sp3d>
-      </dsp:spPr>
-      <dsp:style>
-        <a:lnRef idx="0">
-          <a:scrgbClr r="0" g="0" b="0"/>
-        </a:lnRef>
-        <a:fillRef idx="3">
-          <a:scrgbClr r="0" g="0" b="0"/>
-        </a:fillRef>
-        <a:effectRef idx="2">
-          <a:scrgbClr r="0" g="0" b="0"/>
-        </a:effectRef>
-        <a:fontRef idx="minor">
-          <a:schemeClr val="lt1"/>
-        </a:fontRef>
-      </dsp:style>
-      <dsp:txBody>
-        <a:bodyPr spcFirstLastPara="0" vert="horz" wrap="square" lIns="91440" tIns="91440" rIns="91440" bIns="91440" numCol="1" spcCol="1270" anchor="ctr" anchorCtr="0">
-          <a:noAutofit/>
-        </a:bodyPr>
-        <a:lstStyle/>
-        <a:p>
-          <a:pPr lvl="0" algn="ctr" defTabSz="1066800">
-            <a:lnSpc>
-              <a:spcPct val="90000"/>
-            </a:lnSpc>
-            <a:spcBef>
-              <a:spcPct val="0"/>
-            </a:spcBef>
-            <a:spcAft>
-              <a:spcPct val="35000"/>
-            </a:spcAft>
-          </a:pPr>
-          <a:r>
-            <a:rPr lang="en-US" sz="2400" kern="1200" dirty="0" smtClean="0">
-              <a:solidFill>
-                <a:srgbClr val="D9D9D9"/>
-              </a:solidFill>
-            </a:rPr>
-            <a:t>Run tests and debug </a:t>
-          </a:r>
-          <a:br>
-            <a:rPr lang="en-US" sz="2400" kern="1200" dirty="0" smtClean="0">
-              <a:solidFill>
-                <a:srgbClr val="D9D9D9"/>
-              </a:solidFill>
-            </a:rPr>
-          </a:br>
-          <a:r>
-            <a:rPr lang="en-US" sz="2000" kern="1200" dirty="0" smtClean="0">
-              <a:solidFill>
-                <a:srgbClr val="D9D9D9"/>
-              </a:solidFill>
-            </a:rPr>
-            <a:t>until </a:t>
-          </a:r>
-          <a:r>
-            <a:rPr lang="en-US" sz="2000" i="1" kern="1200" dirty="0" smtClean="0">
-              <a:solidFill>
-                <a:srgbClr val="D9D9D9"/>
-              </a:solidFill>
-            </a:rPr>
-            <a:t>all</a:t>
-          </a:r>
-          <a:r>
-            <a:rPr lang="en-US" sz="2000" kern="1200" dirty="0" smtClean="0">
-              <a:solidFill>
-                <a:srgbClr val="D9D9D9"/>
-              </a:solidFill>
-            </a:rPr>
-            <a:t> tests pass</a:t>
-          </a:r>
-        </a:p>
-      </dsp:txBody>
-      <dsp:txXfrm>
-        <a:off x="1717181" y="3096104"/>
-        <a:ext cx="3780875" cy="642925"/>
-      </dsp:txXfrm>
-    </dsp:sp>
-    <dsp:sp modelId="{B4CC5E68-BD20-49EE-86FA-E08541A3FE12}">
-      <dsp:nvSpPr>
-        <dsp:cNvPr id="0" name=""/>
-        <dsp:cNvSpPr/>
-      </dsp:nvSpPr>
-      <dsp:spPr>
-        <a:xfrm rot="5400000">
-          <a:off x="3479569" y="3776104"/>
-          <a:ext cx="256098" cy="307318"/>
-        </a:xfrm>
-        <a:prstGeom prst="rightArrow">
-          <a:avLst>
-            <a:gd name="adj1" fmla="val 60000"/>
-            <a:gd name="adj2" fmla="val 50000"/>
-          </a:avLst>
-        </a:prstGeom>
-        <a:solidFill>
-          <a:srgbClr val="FFFFFF"/>
-        </a:solidFill>
-        <a:ln w="38100" cmpd="sng">
-          <a:solidFill>
-            <a:srgbClr val="BFBFBF"/>
-          </a:solidFill>
-        </a:ln>
-        <a:effectLst/>
-        <a:scene3d>
-          <a:camera prst="orthographicFront" fov="0">
-            <a:rot lat="0" lon="0" rev="0"/>
-          </a:camera>
-          <a:lightRig rig="balanced" dir="t">
-            <a:rot lat="0" lon="0" rev="0"/>
-          </a:lightRig>
-        </a:scene3d>
-        <a:sp3d prstMaterial="matte">
-          <a:bevelT w="0" h="0"/>
-          <a:contourClr>
-            <a:scrgbClr r="0" g="0" b="0">
-              <a:tint val="100000"/>
-              <a:shade val="100000"/>
-              <a:hueMod val="100000"/>
-              <a:satMod val="100000"/>
-            </a:scrgbClr>
-          </a:contourClr>
-        </a:sp3d>
-      </dsp:spPr>
-      <dsp:style>
-        <a:lnRef idx="0">
-          <a:scrgbClr r="0" g="0" b="0"/>
-        </a:lnRef>
-        <a:fillRef idx="3">
-          <a:scrgbClr r="0" g="0" b="0"/>
-        </a:fillRef>
-        <a:effectRef idx="2">
-          <a:scrgbClr r="0" g="0" b="0"/>
-        </a:effectRef>
-        <a:fontRef idx="minor">
-          <a:schemeClr val="lt1"/>
-        </a:fontRef>
-      </dsp:style>
-      <dsp:txBody>
-        <a:bodyPr spcFirstLastPara="0" vert="horz" wrap="square" lIns="0" tIns="0" rIns="0" bIns="0" numCol="1" spcCol="1270" anchor="ctr" anchorCtr="0">
-          <a:noAutofit/>
-        </a:bodyPr>
-        <a:lstStyle/>
-        <a:p>
-          <a:pPr lvl="0" algn="ctr" defTabSz="889000">
-            <a:lnSpc>
-              <a:spcPct val="90000"/>
-            </a:lnSpc>
-            <a:spcBef>
-              <a:spcPct val="0"/>
-            </a:spcBef>
-            <a:spcAft>
-              <a:spcPct val="35000"/>
-            </a:spcAft>
-          </a:pPr>
-          <a:endParaRPr lang="en-GB" sz="2000" kern="1200"/>
-        </a:p>
-      </dsp:txBody>
-      <dsp:txXfrm rot="-5400000">
-        <a:off x="3515424" y="3801714"/>
-        <a:ext cx="184390" cy="179269"/>
-      </dsp:txXfrm>
-    </dsp:sp>
-    <dsp:sp modelId="{C45FEE31-6BF1-4E83-9497-1224D8F07991}">
-      <dsp:nvSpPr>
-        <dsp:cNvPr id="0" name=""/>
-        <dsp:cNvSpPr/>
-      </dsp:nvSpPr>
-      <dsp:spPr>
-        <a:xfrm>
-          <a:off x="1697179" y="4100496"/>
-          <a:ext cx="3820879" cy="682929"/>
-        </a:xfrm>
-        <a:prstGeom prst="roundRect">
-          <a:avLst>
-            <a:gd name="adj" fmla="val 10000"/>
-          </a:avLst>
-        </a:prstGeom>
-        <a:solidFill>
-          <a:srgbClr val="FFFFFF"/>
-        </a:solidFill>
-        <a:ln w="38100" cmpd="sng">
-          <a:solidFill>
-            <a:srgbClr val="0ECC00"/>
-          </a:solidFill>
-        </a:ln>
-        <a:effectLst/>
-        <a:scene3d>
-          <a:camera prst="orthographicFront" fov="0">
-            <a:rot lat="0" lon="0" rev="0"/>
-          </a:camera>
-          <a:lightRig rig="balanced" dir="t">
-            <a:rot lat="0" lon="0" rev="0"/>
-          </a:lightRig>
-        </a:scene3d>
-        <a:sp3d prstMaterial="matte">
-          <a:bevelT w="0" h="0"/>
-          <a:contourClr>
-            <a:scrgbClr r="0" g="0" b="0">
-              <a:tint val="100000"/>
-              <a:shade val="100000"/>
-              <a:hueMod val="100000"/>
-              <a:satMod val="100000"/>
-            </a:scrgbClr>
-          </a:contourClr>
-        </a:sp3d>
-      </dsp:spPr>
-      <dsp:style>
-        <a:lnRef idx="0">
-          <a:scrgbClr r="0" g="0" b="0"/>
-        </a:lnRef>
-        <a:fillRef idx="3">
-          <a:scrgbClr r="0" g="0" b="0"/>
-        </a:fillRef>
-        <a:effectRef idx="2">
-          <a:scrgbClr r="0" g="0" b="0"/>
-        </a:effectRef>
-        <a:fontRef idx="minor">
-          <a:schemeClr val="lt1"/>
-        </a:fontRef>
-      </dsp:style>
-      <dsp:txBody>
-        <a:bodyPr spcFirstLastPara="0" vert="horz" wrap="square" lIns="91440" tIns="91440" rIns="91440" bIns="91440" numCol="1" spcCol="1270" anchor="ctr" anchorCtr="0">
-          <a:noAutofit/>
-        </a:bodyPr>
-        <a:lstStyle/>
-        <a:p>
-          <a:pPr lvl="0" algn="ctr" defTabSz="1066800">
-            <a:lnSpc>
-              <a:spcPct val="90000"/>
-            </a:lnSpc>
-            <a:spcBef>
-              <a:spcPct val="0"/>
-            </a:spcBef>
-            <a:spcAft>
-              <a:spcPct val="35000"/>
-            </a:spcAft>
-          </a:pPr>
-          <a:r>
-            <a:rPr lang="en-US" sz="2400" kern="1200" dirty="0" smtClean="0">
-              <a:solidFill>
-                <a:srgbClr val="000000"/>
-              </a:solidFill>
-            </a:rPr>
-            <a:t>Refactor and optimize </a:t>
-          </a:r>
-          <a:br>
-            <a:rPr lang="en-US" sz="2400" kern="1200" dirty="0" smtClean="0">
-              <a:solidFill>
-                <a:srgbClr val="000000"/>
-              </a:solidFill>
-            </a:rPr>
-          </a:br>
-          <a:r>
-            <a:rPr lang="en-US" sz="2000" kern="1200" dirty="0" smtClean="0">
-              <a:solidFill>
-                <a:srgbClr val="000000"/>
-              </a:solidFill>
-            </a:rPr>
-            <a:t>only if necessary</a:t>
-          </a:r>
-        </a:p>
-      </dsp:txBody>
-      <dsp:txXfrm>
-        <a:off x="1717181" y="4120498"/>
-        <a:ext cx="3780875" cy="642925"/>
-      </dsp:txXfrm>
-    </dsp:sp>
   </dsp:spTree>
 </dsp:drawing>
 </file>
@@ -29091,7 +28224,7 @@
                 <a:latin typeface="Courier New"/>
                 <a:cs typeface="Courier New"/>
               </a:rPr>
-              <a:t>hands_on_exercises/pyanno_voting</a:t>
+              <a:t>hands_on/pyanno_voting</a:t>
             </a:r>
           </a:p>
           <a:p>
@@ -29129,7 +28262,7 @@
                 <a:latin typeface="Courier New"/>
                 <a:cs typeface="Courier New"/>
               </a:rPr>
-              <a:t> -v discover</a:t>
+              <a:t> discover –v</a:t>
             </a:r>
             <a:endParaRPr lang="en-US">
               <a:latin typeface="Courier New"/>
@@ -29313,7 +28446,7 @@
                 <a:latin typeface="Courier New"/>
                 <a:cs typeface="Courier New"/>
               </a:rPr>
-              <a:t> [-v] discover</a:t>
+              <a:t> discover [-v]</a:t>
             </a:r>
             <a:endParaRPr lang="en-US" dirty="0">
               <a:cs typeface="Courier New"/>
@@ -31996,7 +31129,7 @@
           <a:p>
             <a:r>
               <a:rPr lang="en-US"/>
-              <a:t>Add a dummy test to test_voting: test that </a:t>
+              <a:t>Add a dummy test to test_voting.py: test that </a:t>
             </a:r>
             <a:br>
               <a:rPr lang="en-US"/>
@@ -34472,7 +33605,12 @@
             <p:ph sz="quarter" idx="1"/>
           </p:nvPr>
         </p:nvSpPr>
-        <p:spPr/>
+        <p:spPr>
+          <a:xfrm>
+            <a:off x="457200" y="1219200"/>
+            <a:ext cx="8435280" cy="4937760"/>
+          </a:xfrm>
+        </p:spPr>
         <p:txBody>
           <a:bodyPr/>
           <a:lstStyle/>
@@ -34485,13 +33623,13 @@
               <a:rPr lang="en-US"/>
             </a:br>
             <a:r>
-              <a:rPr lang="en-US" sz="2000">
+              <a:rPr lang="en-US" sz="1800">
                 <a:latin typeface="Courier New"/>
                 <a:cs typeface="Courier New"/>
               </a:rPr>
-              <a:t>git@github.com:ASPP/testing_debugging_profiling.git</a:t>
-            </a:r>
-            <a:endParaRPr lang="en-US">
+              <a:t>https://github.com/ASPP/testing_debugging_profiling.git</a:t>
+            </a:r>
+            <a:endParaRPr lang="en-US" sz="2000">
               <a:latin typeface="Courier New"/>
               <a:cs typeface="Courier New"/>
             </a:endParaRPr>

</xml_diff>

<commit_message>
Final version of slides!
</commit_message>
<xml_diff>
--- a/testing-debugging-profiling.pptx
+++ b/testing-debugging-profiling.pptx
@@ -26642,11 +26642,7 @@
           <a:p>
             <a:r>
               <a:rPr lang="en-US" dirty="0"/>
-              <a:t>Tools </a:t>
-            </a:r>
-            <a:r>
-              <a:rPr lang="en-US" dirty="0"/>
-              <a:t>to efficiently build scientific code</a:t>
+              <a:t>Tools to efficiently build scientific code</a:t>
             </a:r>
             <a:br>
               <a:rPr lang="en-US" dirty="0"/>
@@ -30341,7 +30337,6 @@
               <a:rPr lang="en-GB" dirty="0"/>
               <a:t>Possibly your first test file</a:t>
             </a:r>
-            <a:endParaRPr lang="en-GB" dirty="0"/>
           </a:p>
         </p:txBody>
       </p:sp>
@@ -30375,7 +30370,6 @@
               <a:rPr lang="en-US" dirty="0"/>
               <a:t>:</a:t>
             </a:r>
-            <a:endParaRPr lang="en-US" dirty="0"/>
           </a:p>
           <a:p>
             <a:endParaRPr lang="en-US"/>
@@ -30456,8 +30450,8 @@
         </p:nvSpPr>
         <p:spPr bwMode="auto">
           <a:xfrm>
-            <a:off x="827584" y="2014211"/>
-            <a:ext cx="7502026" cy="3262431"/>
+            <a:off x="827584" y="1798768"/>
+            <a:ext cx="7502026" cy="3693319"/>
           </a:xfrm>
           <a:prstGeom prst="rect">
             <a:avLst/>
@@ -30481,7 +30475,7 @@
           <a:lstStyle/>
           <a:p>
             <a:r>
-              <a:rPr lang="en-US" sz="1600">
+              <a:rPr lang="en-US" sz="1800">
                 <a:solidFill>
                   <a:srgbClr val="7F007F"/>
                 </a:solidFill>
@@ -30492,7 +30486,7 @@
               <a:t>def</a:t>
             </a:r>
             <a:r>
-              <a:rPr lang="en-US" sz="1600">
+              <a:rPr lang="en-US" sz="1800">
                 <a:solidFill>
                   <a:srgbClr val="000000"/>
                 </a:solidFill>
@@ -30503,7 +30497,7 @@
               <a:t> </a:t>
             </a:r>
             <a:r>
-              <a:rPr lang="en-US" sz="1600">
+              <a:rPr lang="en-US" sz="1800">
                 <a:solidFill>
                   <a:srgbClr val="0000FF"/>
                 </a:solidFill>
@@ -30514,7 +30508,7 @@
               <a:t>test_arithmetic</a:t>
             </a:r>
             <a:r>
-              <a:rPr lang="en-US" sz="1600">
+              <a:rPr lang="en-US" sz="1800">
                 <a:solidFill>
                   <a:srgbClr val="000000"/>
                 </a:solidFill>
@@ -30525,7 +30519,7 @@
               <a:t>():</a:t>
             </a:r>
             <a:br>
-              <a:rPr lang="en-US" sz="1600">
+              <a:rPr lang="en-US" sz="1800">
                 <a:solidFill>
                   <a:srgbClr val="000000"/>
                 </a:solidFill>
@@ -30535,7 +30529,7 @@
               </a:rPr>
             </a:br>
             <a:r>
-              <a:rPr lang="en-US" sz="1600">
+              <a:rPr lang="en-US" sz="1800">
                 <a:solidFill>
                   <a:srgbClr val="000000"/>
                 </a:solidFill>
@@ -30546,7 +30540,7 @@
               <a:t>    </a:t>
             </a:r>
             <a:r>
-              <a:rPr lang="en-US" sz="1600">
+              <a:rPr lang="en-US" sz="1800">
                 <a:solidFill>
                   <a:srgbClr val="7F007F"/>
                 </a:solidFill>
@@ -30557,7 +30551,7 @@
               <a:t>assert</a:t>
             </a:r>
             <a:r>
-              <a:rPr lang="en-US" sz="1600">
+              <a:rPr lang="en-US" sz="1800">
                 <a:solidFill>
                   <a:srgbClr val="000000"/>
                 </a:solidFill>
@@ -30568,7 +30562,7 @@
               <a:t> 1 == 1</a:t>
             </a:r>
             <a:br>
-              <a:rPr lang="en-US" sz="1600">
+              <a:rPr lang="en-US" sz="1800">
                 <a:solidFill>
                   <a:srgbClr val="000000"/>
                 </a:solidFill>
@@ -30578,7 +30572,7 @@
               </a:rPr>
             </a:br>
             <a:r>
-              <a:rPr lang="en-US" sz="1600">
+              <a:rPr lang="en-US" sz="1800">
                 <a:solidFill>
                   <a:srgbClr val="000000"/>
                 </a:solidFill>
@@ -30589,7 +30583,7 @@
               <a:t>    </a:t>
             </a:r>
             <a:r>
-              <a:rPr lang="en-US" sz="1600">
+              <a:rPr lang="en-US" sz="1800">
                 <a:solidFill>
                   <a:srgbClr val="7F007F"/>
                 </a:solidFill>
@@ -30600,7 +30594,7 @@
               <a:t>assert</a:t>
             </a:r>
             <a:r>
-              <a:rPr lang="en-US" sz="1600">
+              <a:rPr lang="en-US" sz="1800">
                 <a:solidFill>
                   <a:srgbClr val="000000"/>
                 </a:solidFill>
@@ -30611,7 +30605,7 @@
               <a:t> 2 * 3 == 6</a:t>
             </a:r>
             <a:br>
-              <a:rPr lang="en-US" sz="1600">
+              <a:rPr lang="en-US" sz="1800">
                 <a:solidFill>
                   <a:srgbClr val="000000"/>
                 </a:solidFill>
@@ -30621,7 +30615,7 @@
               </a:rPr>
             </a:br>
             <a:r>
-              <a:rPr lang="en-US" sz="1600">
+              <a:rPr lang="en-US" sz="1800">
                 <a:solidFill>
                   <a:srgbClr val="000000"/>
                 </a:solidFill>
@@ -30632,7 +30626,7 @@
               <a:t/>
             </a:r>
             <a:br>
-              <a:rPr lang="en-US" sz="1600">
+              <a:rPr lang="en-US" sz="1800">
                 <a:solidFill>
                   <a:srgbClr val="000000"/>
                 </a:solidFill>
@@ -30642,7 +30636,7 @@
               </a:rPr>
             </a:br>
             <a:r>
-              <a:rPr lang="en-US" sz="1600">
+              <a:rPr lang="en-US" sz="1800">
                 <a:solidFill>
                   <a:srgbClr val="7F007F"/>
                 </a:solidFill>
@@ -30653,7 +30647,7 @@
               <a:t>def</a:t>
             </a:r>
             <a:r>
-              <a:rPr lang="en-US" sz="1600">
+              <a:rPr lang="en-US" sz="1800">
                 <a:solidFill>
                   <a:srgbClr val="000000"/>
                 </a:solidFill>
@@ -30664,7 +30658,7 @@
               <a:t> </a:t>
             </a:r>
             <a:r>
-              <a:rPr lang="en-US" sz="1600">
+              <a:rPr lang="en-US" sz="1800">
                 <a:solidFill>
                   <a:srgbClr val="0000FF"/>
                 </a:solidFill>
@@ -30675,7 +30669,7 @@
               <a:t>test_len_list</a:t>
             </a:r>
             <a:r>
-              <a:rPr lang="en-US" sz="1600">
+              <a:rPr lang="en-US" sz="1800">
                 <a:solidFill>
                   <a:srgbClr val="000000"/>
                 </a:solidFill>
@@ -30686,7 +30680,7 @@
               <a:t>():</a:t>
             </a:r>
             <a:br>
-              <a:rPr lang="en-US" sz="1600">
+              <a:rPr lang="en-US" sz="1800">
                 <a:solidFill>
                   <a:srgbClr val="000000"/>
                 </a:solidFill>
@@ -30696,7 +30690,7 @@
               </a:rPr>
             </a:br>
             <a:r>
-              <a:rPr lang="en-US" sz="1600">
+              <a:rPr lang="en-US" sz="1800">
                 <a:solidFill>
                   <a:srgbClr val="000000"/>
                 </a:solidFill>
@@ -30707,7 +30701,7 @@
               <a:t>    lst = [</a:t>
             </a:r>
             <a:r>
-              <a:rPr lang="en-US" sz="1600">
+              <a:rPr lang="en-US" sz="1800">
                 <a:solidFill>
                   <a:srgbClr val="8B2252"/>
                 </a:solidFill>
@@ -30718,7 +30712,7 @@
               <a:t>'a'</a:t>
             </a:r>
             <a:r>
-              <a:rPr lang="en-US" sz="1600">
+              <a:rPr lang="en-US" sz="1800">
                 <a:solidFill>
                   <a:srgbClr val="000000"/>
                 </a:solidFill>
@@ -30729,7 +30723,7 @@
               <a:t>, </a:t>
             </a:r>
             <a:r>
-              <a:rPr lang="en-US" sz="1600">
+              <a:rPr lang="en-US" sz="1800">
                 <a:solidFill>
                   <a:srgbClr val="8B2252"/>
                 </a:solidFill>
@@ -30740,7 +30734,7 @@
               <a:t>'b'</a:t>
             </a:r>
             <a:r>
-              <a:rPr lang="en-US" sz="1600">
+              <a:rPr lang="en-US" sz="1800">
                 <a:solidFill>
                   <a:srgbClr val="000000"/>
                 </a:solidFill>
@@ -30751,7 +30745,7 @@
               <a:t>, </a:t>
             </a:r>
             <a:r>
-              <a:rPr lang="en-US" sz="1600">
+              <a:rPr lang="en-US" sz="1800">
                 <a:solidFill>
                   <a:srgbClr val="8B2252"/>
                 </a:solidFill>
@@ -30762,7 +30756,7 @@
               <a:t>'c'</a:t>
             </a:r>
             <a:r>
-              <a:rPr lang="en-US" sz="1600">
+              <a:rPr lang="en-US" sz="1800">
                 <a:solidFill>
                   <a:srgbClr val="000000"/>
                 </a:solidFill>
@@ -30773,7 +30767,7 @@
               <a:t>]</a:t>
             </a:r>
             <a:br>
-              <a:rPr lang="en-US" sz="1600">
+              <a:rPr lang="en-US" sz="1800">
                 <a:solidFill>
                   <a:srgbClr val="000000"/>
                 </a:solidFill>
@@ -30783,7 +30777,7 @@
               </a:rPr>
             </a:br>
             <a:r>
-              <a:rPr lang="en-US" sz="1600">
+              <a:rPr lang="en-US" sz="1800">
                 <a:solidFill>
                   <a:srgbClr val="000000"/>
                 </a:solidFill>
@@ -30794,7 +30788,7 @@
               <a:t>    </a:t>
             </a:r>
             <a:r>
-              <a:rPr lang="en-US" sz="1600">
+              <a:rPr lang="en-US" sz="1800">
                 <a:solidFill>
                   <a:srgbClr val="7F007F"/>
                 </a:solidFill>
@@ -30805,7 +30799,7 @@
               <a:t>assert</a:t>
             </a:r>
             <a:r>
-              <a:rPr lang="en-US" sz="1600">
+              <a:rPr lang="en-US" sz="1800">
                 <a:solidFill>
                   <a:srgbClr val="000000"/>
                 </a:solidFill>
@@ -30816,7 +30810,7 @@
               <a:t> </a:t>
             </a:r>
             <a:r>
-              <a:rPr lang="en-US" sz="1600">
+              <a:rPr lang="en-US" sz="1800">
                 <a:solidFill>
                   <a:srgbClr val="7F007F"/>
                 </a:solidFill>
@@ -30827,7 +30821,7 @@
               <a:t>len</a:t>
             </a:r>
             <a:r>
-              <a:rPr lang="en-US" sz="1600">
+              <a:rPr lang="en-US" sz="1800">
                 <a:solidFill>
                   <a:srgbClr val="000000"/>
                 </a:solidFill>
@@ -30838,7 +30832,7 @@
               <a:t>(lst) == 3</a:t>
             </a:r>
             <a:br>
-              <a:rPr lang="en-US" sz="1600">
+              <a:rPr lang="en-US" sz="1800">
                 <a:solidFill>
                   <a:srgbClr val="000000"/>
                 </a:solidFill>
@@ -30847,7 +30841,7 @@
                 <a:cs typeface="Courier New"/>
               </a:rPr>
             </a:br>
-            <a:endParaRPr lang="en-US" sz="1600">
+            <a:endParaRPr lang="en-US" sz="1800">
               <a:solidFill>
                 <a:srgbClr val="000000"/>
               </a:solidFill>
@@ -30858,7 +30852,7 @@
           </a:p>
           <a:p>
             <a:r>
-              <a:rPr lang="en-US" sz="1600">
+              <a:rPr lang="en-US" sz="1800">
                 <a:solidFill>
                   <a:srgbClr val="000000"/>
                 </a:solidFill>
@@ -30868,7 +30862,7 @@
               <a:t/>
             </a:r>
             <a:br>
-              <a:rPr lang="en-US" sz="1600">
+              <a:rPr lang="en-US" sz="1800">
                 <a:solidFill>
                   <a:srgbClr val="000000"/>
                 </a:solidFill>
@@ -30877,7 +30871,7 @@
               </a:rPr>
             </a:br>
             <a:r>
-              <a:rPr lang="en-US" sz="1600">
+              <a:rPr lang="en-US" sz="1800">
                 <a:solidFill>
                   <a:srgbClr val="000000"/>
                 </a:solidFill>
@@ -30887,7 +30881,7 @@
               <a:t/>
             </a:r>
             <a:br>
-              <a:rPr lang="en-US" sz="1600">
+              <a:rPr lang="en-US" sz="1800">
                 <a:solidFill>
                   <a:srgbClr val="000000"/>
                 </a:solidFill>
@@ -30895,7 +30889,7 @@
                 <a:latin typeface="Monaco"/>
               </a:rPr>
             </a:br>
-            <a:endParaRPr lang="en-US" sz="1600">
+            <a:endParaRPr lang="en-US" sz="1800">
               <a:solidFill>
                 <a:srgbClr val="000000"/>
               </a:solidFill>
@@ -30905,7 +30899,7 @@
           </a:p>
           <a:p>
             <a:pPr eaLnBrk="1" hangingPunct="1"/>
-            <a:endParaRPr lang="en-US" sz="1500" dirty="0">
+            <a:endParaRPr lang="en-US" sz="1600" dirty="0">
               <a:solidFill>
                 <a:srgbClr val="0000FF"/>
               </a:solidFill>
@@ -30931,7 +30925,7 @@
               <a:buNone/>
               <a:tabLst/>
             </a:pPr>
-            <a:endParaRPr lang="en-US" sz="1500" dirty="0">
+            <a:endParaRPr lang="en-US" sz="1600" dirty="0">
               <a:solidFill>
                 <a:srgbClr val="0000FF"/>
               </a:solidFill>
@@ -35639,7 +35633,7 @@
                 <a:latin typeface="Courier New"/>
                 <a:cs typeface="Courier New"/>
               </a:rPr>
-              <a:t>with self.assertRaises(IOError):</a:t>
+              <a:t>with raises(IOError):</a:t>
             </a:r>
             <a:br>
               <a:rPr lang="en-US" sz="2000" dirty="0">
@@ -35707,7 +35701,7 @@
                 <a:latin typeface="Courier New"/>
                 <a:cs typeface="Courier New"/>
               </a:rPr>
-              <a:t>with self.assertRaises(Exception):</a:t>
+              <a:t>with raises(Exception):</a:t>
             </a:r>
             <a:br>
               <a:rPr lang="en-US" sz="2000" dirty="0">
@@ -41690,7 +41684,6 @@
               <a:rPr lang="en-US"/>
               <a:t>Run the test again and watch it pass</a:t>
             </a:r>
-            <a:endParaRPr lang="en-US"/>
           </a:p>
         </p:txBody>
       </p:sp>
@@ -42209,17 +42202,7 @@
                   </a:schemeClr>
                 </a:solidFill>
               </a:rPr>
-              <a:t> is m</a:t>
-            </a:r>
-            <a:r>
-              <a:rPr lang="en-US" dirty="0">
-                <a:solidFill>
-                  <a:schemeClr val="bg1">
-                    <a:lumMod val="75000"/>
-                  </a:schemeClr>
-                </a:solidFill>
-              </a:rPr>
-              <a:t>ain requirement for scientific code</a:t>
+              <a:t> is main requirement for scientific code</a:t>
             </a:r>
           </a:p>
           <a:p>
@@ -42856,7 +42839,7 @@
           <a:p>
             <a:r>
               <a:rPr lang="en-US"/>
-              <a:t>Warm-up exercise</a:t>
+              <a:t>Warm-up project</a:t>
             </a:r>
           </a:p>
         </p:txBody>
@@ -49074,27 +49057,6 @@
             <a:normAutofit/>
           </a:bodyPr>
           <a:lstStyle/>
-          <a:p>
-            <a:r>
-              <a:rPr lang="en-GB" dirty="0"/>
-              <a:t>They laughed when she started writing tests. </a:t>
-            </a:r>
-            <a:br>
-              <a:rPr lang="en-GB" dirty="0"/>
-            </a:br>
-            <a:r>
-              <a:rPr lang="en-GB" dirty="0"/>
-              <a:t>But when she got tenure</a:t>
-            </a:r>
-            <a:r>
-              <a:rPr lang="is-IS" dirty="0"/>
-              <a:t>…</a:t>
-            </a:r>
-            <a:endParaRPr lang="en-GB" dirty="0"/>
-          </a:p>
-          <a:p>
-            <a:endParaRPr lang="en-GB" dirty="0" smtClean="0"/>
-          </a:p>
           <a:p>
             <a:r>
               <a:rPr lang="en-GB" dirty="0"/>

</xml_diff>

<commit_message>
Final version of 2016 version.
</commit_message>
<xml_diff>
--- a/testing-debugging-profiling.pptx
+++ b/testing-debugging-profiling.pptx
@@ -3672,8 +3672,8 @@
     <dgm:cxn modelId="{C3F663E8-CDBC-AD42-8445-A68824C7C674}" type="presOf" srcId="{D8FC48C4-469B-40DC-950F-ABA168836D34}" destId="{3725F2C1-AA1D-49A3-9D73-9D444D08CE71}" srcOrd="0" destOrd="0" presId="urn:microsoft.com/office/officeart/2005/8/layout/process2"/>
     <dgm:cxn modelId="{0F95B477-3571-3442-BE80-0888F825957B}" srcId="{47AA4630-B738-4650-913F-7378CC40D312}" destId="{E188BD28-8BF3-DF4E-89B0-D0D9BDDAD858}" srcOrd="0" destOrd="0" parTransId="{36E39B49-FFE1-4141-AC7D-DEC0690E85F8}" sibTransId="{7764EA43-B182-BC4F-BCDA-333200F918B8}"/>
     <dgm:cxn modelId="{C9026A74-F1DD-E146-9422-19412D77C7FA}" type="presOf" srcId="{04BB66AA-DBE2-4BFD-A94E-A31165187E75}" destId="{E202264D-36A3-408A-9050-7FBD30D2645C}" srcOrd="0" destOrd="0" presId="urn:microsoft.com/office/officeart/2005/8/layout/process2"/>
+    <dgm:cxn modelId="{CE2432D2-047D-C84F-BE85-931E49079978}" type="presOf" srcId="{EFB1699C-C280-416C-B6B3-B9CB2E52EAA1}" destId="{B2BEE0C4-D8B2-432A-8CB1-C2162205DCA3}" srcOrd="1" destOrd="0" presId="urn:microsoft.com/office/officeart/2005/8/layout/process2"/>
     <dgm:cxn modelId="{B9ADBC9D-82F2-364C-83D5-7EEEA8E21DB6}" type="presOf" srcId="{96BC0EEB-57F0-4267-86F0-4EA98B40D230}" destId="{C45FEE31-6BF1-4E83-9497-1224D8F07991}" srcOrd="0" destOrd="0" presId="urn:microsoft.com/office/officeart/2005/8/layout/process2"/>
-    <dgm:cxn modelId="{CE2432D2-047D-C84F-BE85-931E49079978}" type="presOf" srcId="{EFB1699C-C280-416C-B6B3-B9CB2E52EAA1}" destId="{B2BEE0C4-D8B2-432A-8CB1-C2162205DCA3}" srcOrd="1" destOrd="0" presId="urn:microsoft.com/office/officeart/2005/8/layout/process2"/>
     <dgm:cxn modelId="{8B1827B0-24B7-EE47-8D05-143F23981B45}" type="presOf" srcId="{6CD60870-D228-4E7C-AB37-75604251742A}" destId="{3FA6B472-D1F3-409B-BF18-F1310278CB78}" srcOrd="0" destOrd="0" presId="urn:microsoft.com/office/officeart/2005/8/layout/process2"/>
     <dgm:cxn modelId="{165AE32A-34E6-4032-86AF-87A045F8F59C}" srcId="{47AA4630-B738-4650-913F-7378CC40D312}" destId="{D8FC48C4-469B-40DC-950F-ABA168836D34}" srcOrd="3" destOrd="0" parTransId="{3B29C759-9861-4F5A-9C39-84993FBBD849}" sibTransId="{CB49FD0C-9B39-4860-B781-669D9FC3FB40}"/>
     <dgm:cxn modelId="{F77116B4-48FE-C046-9571-D046EADCF564}" type="presOf" srcId="{97DB59AD-8506-4A74-BB78-BA533F4FB10F}" destId="{87C32DCB-D7CA-425A-A14D-DC1B34BAA990}" srcOrd="0" destOrd="0" presId="urn:microsoft.com/office/officeart/2005/8/layout/process2"/>
@@ -4282,24 +4282,24 @@
   </dgm:ptLst>
   <dgm:cxnLst>
     <dgm:cxn modelId="{8747F884-7CA4-413D-AFAC-DD5CAE19DDA5}" srcId="{47AA4630-B738-4650-913F-7378CC40D312}" destId="{6CD60870-D228-4E7C-AB37-75604251742A}" srcOrd="2" destOrd="0" parTransId="{75E4D45F-C716-48A2-8E57-584BA67C4566}" sibTransId="{04BB66AA-DBE2-4BFD-A94E-A31165187E75}"/>
+    <dgm:cxn modelId="{D502F2CB-B89C-E34F-A6DF-89B1A25FEDE7}" type="presOf" srcId="{D8FC48C4-469B-40DC-950F-ABA168836D34}" destId="{3725F2C1-AA1D-49A3-9D73-9D444D08CE71}" srcOrd="0" destOrd="0" presId="urn:microsoft.com/office/officeart/2005/8/layout/process2"/>
     <dgm:cxn modelId="{B9FDB916-0E3A-45DF-B817-B4FF0DF0DD0F}" srcId="{47AA4630-B738-4650-913F-7378CC40D312}" destId="{96BC0EEB-57F0-4267-86F0-4EA98B40D230}" srcOrd="4" destOrd="0" parTransId="{A57BE1BC-E807-47AE-8640-A3F276768BED}" sibTransId="{062036D4-7094-47BF-9BE9-A58B2E6A4D41}"/>
-    <dgm:cxn modelId="{D502F2CB-B89C-E34F-A6DF-89B1A25FEDE7}" type="presOf" srcId="{D8FC48C4-469B-40DC-950F-ABA168836D34}" destId="{3725F2C1-AA1D-49A3-9D73-9D444D08CE71}" srcOrd="0" destOrd="0" presId="urn:microsoft.com/office/officeart/2005/8/layout/process2"/>
+    <dgm:cxn modelId="{1B5D7B5E-5E25-644F-BB4B-F1E7896D0731}" type="presOf" srcId="{97DB59AD-8506-4A74-BB78-BA533F4FB10F}" destId="{87C32DCB-D7CA-425A-A14D-DC1B34BAA990}" srcOrd="0" destOrd="0" presId="urn:microsoft.com/office/officeart/2005/8/layout/process2"/>
+    <dgm:cxn modelId="{D086F928-FE0E-4B47-8C13-5FF4984C9F9C}" type="presOf" srcId="{EFB1699C-C280-416C-B6B3-B9CB2E52EAA1}" destId="{143F6140-E7F1-4CCF-A9B1-524762512517}" srcOrd="0" destOrd="0" presId="urn:microsoft.com/office/officeart/2005/8/layout/process2"/>
+    <dgm:cxn modelId="{B8E8490A-B09C-734B-A716-413F24EA4012}" type="presOf" srcId="{EFB1699C-C280-416C-B6B3-B9CB2E52EAA1}" destId="{B2BEE0C4-D8B2-432A-8CB1-C2162205DCA3}" srcOrd="1" destOrd="0" presId="urn:microsoft.com/office/officeart/2005/8/layout/process2"/>
+    <dgm:cxn modelId="{9D8E6E91-508B-E540-99ED-C0D4895B5537}" type="presOf" srcId="{CB49FD0C-9B39-4860-B781-669D9FC3FB40}" destId="{B4CC5E68-BD20-49EE-86FA-E08541A3FE12}" srcOrd="0" destOrd="0" presId="urn:microsoft.com/office/officeart/2005/8/layout/process2"/>
+    <dgm:cxn modelId="{29DFC02F-6195-3043-8F91-015C50C4CEAE}" type="presOf" srcId="{7764EA43-B182-BC4F-BCDA-333200F918B8}" destId="{5EB7E61C-215B-AD45-8738-514EF8F5F4E5}" srcOrd="1" destOrd="0" presId="urn:microsoft.com/office/officeart/2005/8/layout/process2"/>
+    <dgm:cxn modelId="{F91E15A7-C24F-4D74-8B1A-D7C0021B8888}" srcId="{47AA4630-B738-4650-913F-7378CC40D312}" destId="{97DB59AD-8506-4A74-BB78-BA533F4FB10F}" srcOrd="1" destOrd="0" parTransId="{E5F038C7-DBC4-490A-AAFB-6D151F9C0538}" sibTransId="{EFB1699C-C280-416C-B6B3-B9CB2E52EAA1}"/>
+    <dgm:cxn modelId="{9C518300-8071-B04B-8A6B-F7BFA0AC4999}" type="presOf" srcId="{7764EA43-B182-BC4F-BCDA-333200F918B8}" destId="{66533B70-8731-2345-9B98-5A7A7F80153B}" srcOrd="0" destOrd="0" presId="urn:microsoft.com/office/officeart/2005/8/layout/process2"/>
+    <dgm:cxn modelId="{FF83F153-2D58-2E4E-B3E7-2B6600349125}" type="presOf" srcId="{04BB66AA-DBE2-4BFD-A94E-A31165187E75}" destId="{E3B3E849-56D6-49C5-932E-7B5B0F9F195C}" srcOrd="1" destOrd="0" presId="urn:microsoft.com/office/officeart/2005/8/layout/process2"/>
+    <dgm:cxn modelId="{0F95B477-3571-3442-BE80-0888F825957B}" srcId="{47AA4630-B738-4650-913F-7378CC40D312}" destId="{E188BD28-8BF3-DF4E-89B0-D0D9BDDAD858}" srcOrd="0" destOrd="0" parTransId="{36E39B49-FFE1-4141-AC7D-DEC0690E85F8}" sibTransId="{7764EA43-B182-BC4F-BCDA-333200F918B8}"/>
+    <dgm:cxn modelId="{3F4C1D19-41C5-5C46-AB27-79D2FA146B21}" type="presOf" srcId="{E188BD28-8BF3-DF4E-89B0-D0D9BDDAD858}" destId="{8B185A30-22C7-6840-8D3E-58B36EE38549}" srcOrd="0" destOrd="0" presId="urn:microsoft.com/office/officeart/2005/8/layout/process2"/>
+    <dgm:cxn modelId="{298F934D-0BC7-3B4B-8998-C29A1E2FA2F5}" type="presOf" srcId="{CB49FD0C-9B39-4860-B781-669D9FC3FB40}" destId="{BD1FA95E-C45B-4671-BBAB-95DCE436E052}" srcOrd="1" destOrd="0" presId="urn:microsoft.com/office/officeart/2005/8/layout/process2"/>
+    <dgm:cxn modelId="{4F77C843-7170-FB42-AD56-04C07B5BA200}" type="presOf" srcId="{96BC0EEB-57F0-4267-86F0-4EA98B40D230}" destId="{C45FEE31-6BF1-4E83-9497-1224D8F07991}" srcOrd="0" destOrd="0" presId="urn:microsoft.com/office/officeart/2005/8/layout/process2"/>
+    <dgm:cxn modelId="{165AE32A-34E6-4032-86AF-87A045F8F59C}" srcId="{47AA4630-B738-4650-913F-7378CC40D312}" destId="{D8FC48C4-469B-40DC-950F-ABA168836D34}" srcOrd="3" destOrd="0" parTransId="{3B29C759-9861-4F5A-9C39-84993FBBD849}" sibTransId="{CB49FD0C-9B39-4860-B781-669D9FC3FB40}"/>
     <dgm:cxn modelId="{CF6FC7B7-1ABC-5A44-B057-88C52247DFDB}" type="presOf" srcId="{6CD60870-D228-4E7C-AB37-75604251742A}" destId="{3FA6B472-D1F3-409B-BF18-F1310278CB78}" srcOrd="0" destOrd="0" presId="urn:microsoft.com/office/officeart/2005/8/layout/process2"/>
-    <dgm:cxn modelId="{0F95B477-3571-3442-BE80-0888F825957B}" srcId="{47AA4630-B738-4650-913F-7378CC40D312}" destId="{E188BD28-8BF3-DF4E-89B0-D0D9BDDAD858}" srcOrd="0" destOrd="0" parTransId="{36E39B49-FFE1-4141-AC7D-DEC0690E85F8}" sibTransId="{7764EA43-B182-BC4F-BCDA-333200F918B8}"/>
+    <dgm:cxn modelId="{9ED44D31-D359-7A48-807F-414B7B57652D}" type="presOf" srcId="{47AA4630-B738-4650-913F-7378CC40D312}" destId="{7A234B30-A436-41B7-96D9-05CCC2F7ADDC}" srcOrd="0" destOrd="0" presId="urn:microsoft.com/office/officeart/2005/8/layout/process2"/>
     <dgm:cxn modelId="{FA0C0E2A-C034-524E-B609-3005A3507C7A}" type="presOf" srcId="{04BB66AA-DBE2-4BFD-A94E-A31165187E75}" destId="{E202264D-36A3-408A-9050-7FBD30D2645C}" srcOrd="0" destOrd="0" presId="urn:microsoft.com/office/officeart/2005/8/layout/process2"/>
-    <dgm:cxn modelId="{298F934D-0BC7-3B4B-8998-C29A1E2FA2F5}" type="presOf" srcId="{CB49FD0C-9B39-4860-B781-669D9FC3FB40}" destId="{BD1FA95E-C45B-4671-BBAB-95DCE436E052}" srcOrd="1" destOrd="0" presId="urn:microsoft.com/office/officeart/2005/8/layout/process2"/>
-    <dgm:cxn modelId="{29DFC02F-6195-3043-8F91-015C50C4CEAE}" type="presOf" srcId="{7764EA43-B182-BC4F-BCDA-333200F918B8}" destId="{5EB7E61C-215B-AD45-8738-514EF8F5F4E5}" srcOrd="1" destOrd="0" presId="urn:microsoft.com/office/officeart/2005/8/layout/process2"/>
-    <dgm:cxn modelId="{3F4C1D19-41C5-5C46-AB27-79D2FA146B21}" type="presOf" srcId="{E188BD28-8BF3-DF4E-89B0-D0D9BDDAD858}" destId="{8B185A30-22C7-6840-8D3E-58B36EE38549}" srcOrd="0" destOrd="0" presId="urn:microsoft.com/office/officeart/2005/8/layout/process2"/>
-    <dgm:cxn modelId="{165AE32A-34E6-4032-86AF-87A045F8F59C}" srcId="{47AA4630-B738-4650-913F-7378CC40D312}" destId="{D8FC48C4-469B-40DC-950F-ABA168836D34}" srcOrd="3" destOrd="0" parTransId="{3B29C759-9861-4F5A-9C39-84993FBBD849}" sibTransId="{CB49FD0C-9B39-4860-B781-669D9FC3FB40}"/>
-    <dgm:cxn modelId="{D086F928-FE0E-4B47-8C13-5FF4984C9F9C}" type="presOf" srcId="{EFB1699C-C280-416C-B6B3-B9CB2E52EAA1}" destId="{143F6140-E7F1-4CCF-A9B1-524762512517}" srcOrd="0" destOrd="0" presId="urn:microsoft.com/office/officeart/2005/8/layout/process2"/>
-    <dgm:cxn modelId="{FF83F153-2D58-2E4E-B3E7-2B6600349125}" type="presOf" srcId="{04BB66AA-DBE2-4BFD-A94E-A31165187E75}" destId="{E3B3E849-56D6-49C5-932E-7B5B0F9F195C}" srcOrd="1" destOrd="0" presId="urn:microsoft.com/office/officeart/2005/8/layout/process2"/>
-    <dgm:cxn modelId="{B8E8490A-B09C-734B-A716-413F24EA4012}" type="presOf" srcId="{EFB1699C-C280-416C-B6B3-B9CB2E52EAA1}" destId="{B2BEE0C4-D8B2-432A-8CB1-C2162205DCA3}" srcOrd="1" destOrd="0" presId="urn:microsoft.com/office/officeart/2005/8/layout/process2"/>
-    <dgm:cxn modelId="{F91E15A7-C24F-4D74-8B1A-D7C0021B8888}" srcId="{47AA4630-B738-4650-913F-7378CC40D312}" destId="{97DB59AD-8506-4A74-BB78-BA533F4FB10F}" srcOrd="1" destOrd="0" parTransId="{E5F038C7-DBC4-490A-AAFB-6D151F9C0538}" sibTransId="{EFB1699C-C280-416C-B6B3-B9CB2E52EAA1}"/>
-    <dgm:cxn modelId="{4F77C843-7170-FB42-AD56-04C07B5BA200}" type="presOf" srcId="{96BC0EEB-57F0-4267-86F0-4EA98B40D230}" destId="{C45FEE31-6BF1-4E83-9497-1224D8F07991}" srcOrd="0" destOrd="0" presId="urn:microsoft.com/office/officeart/2005/8/layout/process2"/>
-    <dgm:cxn modelId="{9D8E6E91-508B-E540-99ED-C0D4895B5537}" type="presOf" srcId="{CB49FD0C-9B39-4860-B781-669D9FC3FB40}" destId="{B4CC5E68-BD20-49EE-86FA-E08541A3FE12}" srcOrd="0" destOrd="0" presId="urn:microsoft.com/office/officeart/2005/8/layout/process2"/>
-    <dgm:cxn modelId="{9ED44D31-D359-7A48-807F-414B7B57652D}" type="presOf" srcId="{47AA4630-B738-4650-913F-7378CC40D312}" destId="{7A234B30-A436-41B7-96D9-05CCC2F7ADDC}" srcOrd="0" destOrd="0" presId="urn:microsoft.com/office/officeart/2005/8/layout/process2"/>
-    <dgm:cxn modelId="{1B5D7B5E-5E25-644F-BB4B-F1E7896D0731}" type="presOf" srcId="{97DB59AD-8506-4A74-BB78-BA533F4FB10F}" destId="{87C32DCB-D7CA-425A-A14D-DC1B34BAA990}" srcOrd="0" destOrd="0" presId="urn:microsoft.com/office/officeart/2005/8/layout/process2"/>
-    <dgm:cxn modelId="{9C518300-8071-B04B-8A6B-F7BFA0AC4999}" type="presOf" srcId="{7764EA43-B182-BC4F-BCDA-333200F918B8}" destId="{66533B70-8731-2345-9B98-5A7A7F80153B}" srcOrd="0" destOrd="0" presId="urn:microsoft.com/office/officeart/2005/8/layout/process2"/>
     <dgm:cxn modelId="{D10CBB14-61D0-5A4C-9A50-E26F9C5EB347}" type="presParOf" srcId="{7A234B30-A436-41B7-96D9-05CCC2F7ADDC}" destId="{8B185A30-22C7-6840-8D3E-58B36EE38549}" srcOrd="0" destOrd="0" presId="urn:microsoft.com/office/officeart/2005/8/layout/process2"/>
     <dgm:cxn modelId="{8FE40D00-E814-1443-BEB0-B3CC291F595A}" type="presParOf" srcId="{7A234B30-A436-41B7-96D9-05CCC2F7ADDC}" destId="{66533B70-8731-2345-9B98-5A7A7F80153B}" srcOrd="1" destOrd="0" presId="urn:microsoft.com/office/officeart/2005/8/layout/process2"/>
     <dgm:cxn modelId="{A24DEC56-1878-E64B-9D73-E456A25FB8B9}" type="presParOf" srcId="{66533B70-8731-2345-9B98-5A7A7F80153B}" destId="{5EB7E61C-215B-AD45-8738-514EF8F5F4E5}" srcOrd="0" destOrd="0" presId="urn:microsoft.com/office/officeart/2005/8/layout/process2"/>
@@ -4879,24 +4879,24 @@
   </dgm:ptLst>
   <dgm:cxnLst>
     <dgm:cxn modelId="{8747F884-7CA4-413D-AFAC-DD5CAE19DDA5}" srcId="{47AA4630-B738-4650-913F-7378CC40D312}" destId="{6CD60870-D228-4E7C-AB37-75604251742A}" srcOrd="2" destOrd="0" parTransId="{75E4D45F-C716-48A2-8E57-584BA67C4566}" sibTransId="{04BB66AA-DBE2-4BFD-A94E-A31165187E75}"/>
+    <dgm:cxn modelId="{9DCAD1AE-AE8F-C542-993A-46832AD7E3F7}" type="presOf" srcId="{04BB66AA-DBE2-4BFD-A94E-A31165187E75}" destId="{E3B3E849-56D6-49C5-932E-7B5B0F9F195C}" srcOrd="1" destOrd="0" presId="urn:microsoft.com/office/officeart/2005/8/layout/process2"/>
     <dgm:cxn modelId="{B9FDB916-0E3A-45DF-B817-B4FF0DF0DD0F}" srcId="{47AA4630-B738-4650-913F-7378CC40D312}" destId="{96BC0EEB-57F0-4267-86F0-4EA98B40D230}" srcOrd="4" destOrd="0" parTransId="{A57BE1BC-E807-47AE-8640-A3F276768BED}" sibTransId="{062036D4-7094-47BF-9BE9-A58B2E6A4D41}"/>
+    <dgm:cxn modelId="{6689F0B5-F6D2-6146-A3CC-16A7F09ECD95}" type="presOf" srcId="{97DB59AD-8506-4A74-BB78-BA533F4FB10F}" destId="{87C32DCB-D7CA-425A-A14D-DC1B34BAA990}" srcOrd="0" destOrd="0" presId="urn:microsoft.com/office/officeart/2005/8/layout/process2"/>
+    <dgm:cxn modelId="{EB39C2AD-FD57-5049-B098-258DD88E7496}" type="presOf" srcId="{04BB66AA-DBE2-4BFD-A94E-A31165187E75}" destId="{E202264D-36A3-408A-9050-7FBD30D2645C}" srcOrd="0" destOrd="0" presId="urn:microsoft.com/office/officeart/2005/8/layout/process2"/>
+    <dgm:cxn modelId="{0F95B477-3571-3442-BE80-0888F825957B}" srcId="{47AA4630-B738-4650-913F-7378CC40D312}" destId="{E188BD28-8BF3-DF4E-89B0-D0D9BDDAD858}" srcOrd="0" destOrd="0" parTransId="{36E39B49-FFE1-4141-AC7D-DEC0690E85F8}" sibTransId="{7764EA43-B182-BC4F-BCDA-333200F918B8}"/>
     <dgm:cxn modelId="{F4F8E3FF-6FD5-6745-A94E-2A3A6F209DFF}" type="presOf" srcId="{CB49FD0C-9B39-4860-B781-669D9FC3FB40}" destId="{BD1FA95E-C45B-4671-BBAB-95DCE436E052}" srcOrd="1" destOrd="0" presId="urn:microsoft.com/office/officeart/2005/8/layout/process2"/>
+    <dgm:cxn modelId="{E40B25C4-5FF1-D246-9715-8E798430839E}" type="presOf" srcId="{7764EA43-B182-BC4F-BCDA-333200F918B8}" destId="{66533B70-8731-2345-9B98-5A7A7F80153B}" srcOrd="0" destOrd="0" presId="urn:microsoft.com/office/officeart/2005/8/layout/process2"/>
+    <dgm:cxn modelId="{165AE32A-34E6-4032-86AF-87A045F8F59C}" srcId="{47AA4630-B738-4650-913F-7378CC40D312}" destId="{D8FC48C4-469B-40DC-950F-ABA168836D34}" srcOrd="3" destOrd="0" parTransId="{3B29C759-9861-4F5A-9C39-84993FBBD849}" sibTransId="{CB49FD0C-9B39-4860-B781-669D9FC3FB40}"/>
+    <dgm:cxn modelId="{258E6188-D24E-5243-86FE-FF33A3DEEA39}" type="presOf" srcId="{7764EA43-B182-BC4F-BCDA-333200F918B8}" destId="{5EB7E61C-215B-AD45-8738-514EF8F5F4E5}" srcOrd="1" destOrd="0" presId="urn:microsoft.com/office/officeart/2005/8/layout/process2"/>
+    <dgm:cxn modelId="{3E1261D4-078C-EE4B-AFC6-897F3D5D71BD}" type="presOf" srcId="{EFB1699C-C280-416C-B6B3-B9CB2E52EAA1}" destId="{B2BEE0C4-D8B2-432A-8CB1-C2162205DCA3}" srcOrd="1" destOrd="0" presId="urn:microsoft.com/office/officeart/2005/8/layout/process2"/>
+    <dgm:cxn modelId="{2D0ABAC6-DA91-8D46-B554-E9457DCF3A92}" type="presOf" srcId="{47AA4630-B738-4650-913F-7378CC40D312}" destId="{7A234B30-A436-41B7-96D9-05CCC2F7ADDC}" srcOrd="0" destOrd="0" presId="urn:microsoft.com/office/officeart/2005/8/layout/process2"/>
+    <dgm:cxn modelId="{D365E894-A5EB-1247-B4AA-97AE89C3B6F1}" type="presOf" srcId="{EFB1699C-C280-416C-B6B3-B9CB2E52EAA1}" destId="{143F6140-E7F1-4CCF-A9B1-524762512517}" srcOrd="0" destOrd="0" presId="urn:microsoft.com/office/officeart/2005/8/layout/process2"/>
+    <dgm:cxn modelId="{F91E15A7-C24F-4D74-8B1A-D7C0021B8888}" srcId="{47AA4630-B738-4650-913F-7378CC40D312}" destId="{97DB59AD-8506-4A74-BB78-BA533F4FB10F}" srcOrd="1" destOrd="0" parTransId="{E5F038C7-DBC4-490A-AAFB-6D151F9C0538}" sibTransId="{EFB1699C-C280-416C-B6B3-B9CB2E52EAA1}"/>
+    <dgm:cxn modelId="{9DF0477C-A764-8B4F-B772-DEA08EF5B2B1}" type="presOf" srcId="{D8FC48C4-469B-40DC-950F-ABA168836D34}" destId="{3725F2C1-AA1D-49A3-9D73-9D444D08CE71}" srcOrd="0" destOrd="0" presId="urn:microsoft.com/office/officeart/2005/8/layout/process2"/>
+    <dgm:cxn modelId="{26575D07-F418-0F47-847E-EB1CD13E562B}" type="presOf" srcId="{96BC0EEB-57F0-4267-86F0-4EA98B40D230}" destId="{C45FEE31-6BF1-4E83-9497-1224D8F07991}" srcOrd="0" destOrd="0" presId="urn:microsoft.com/office/officeart/2005/8/layout/process2"/>
     <dgm:cxn modelId="{0E210A85-09CF-AA45-A9A9-05D250FD2536}" type="presOf" srcId="{E188BD28-8BF3-DF4E-89B0-D0D9BDDAD858}" destId="{8B185A30-22C7-6840-8D3E-58B36EE38549}" srcOrd="0" destOrd="0" presId="urn:microsoft.com/office/officeart/2005/8/layout/process2"/>
-    <dgm:cxn modelId="{F91E15A7-C24F-4D74-8B1A-D7C0021B8888}" srcId="{47AA4630-B738-4650-913F-7378CC40D312}" destId="{97DB59AD-8506-4A74-BB78-BA533F4FB10F}" srcOrd="1" destOrd="0" parTransId="{E5F038C7-DBC4-490A-AAFB-6D151F9C0538}" sibTransId="{EFB1699C-C280-416C-B6B3-B9CB2E52EAA1}"/>
+    <dgm:cxn modelId="{33D39394-D06E-3C45-A948-C1FD1F42BE5D}" type="presOf" srcId="{6CD60870-D228-4E7C-AB37-75604251742A}" destId="{3FA6B472-D1F3-409B-BF18-F1310278CB78}" srcOrd="0" destOrd="0" presId="urn:microsoft.com/office/officeart/2005/8/layout/process2"/>
     <dgm:cxn modelId="{53D6E192-6B91-4748-A7C9-998CF3DA9B64}" type="presOf" srcId="{CB49FD0C-9B39-4860-B781-669D9FC3FB40}" destId="{B4CC5E68-BD20-49EE-86FA-E08541A3FE12}" srcOrd="0" destOrd="0" presId="urn:microsoft.com/office/officeart/2005/8/layout/process2"/>
-    <dgm:cxn modelId="{E40B25C4-5FF1-D246-9715-8E798430839E}" type="presOf" srcId="{7764EA43-B182-BC4F-BCDA-333200F918B8}" destId="{66533B70-8731-2345-9B98-5A7A7F80153B}" srcOrd="0" destOrd="0" presId="urn:microsoft.com/office/officeart/2005/8/layout/process2"/>
-    <dgm:cxn modelId="{0F95B477-3571-3442-BE80-0888F825957B}" srcId="{47AA4630-B738-4650-913F-7378CC40D312}" destId="{E188BD28-8BF3-DF4E-89B0-D0D9BDDAD858}" srcOrd="0" destOrd="0" parTransId="{36E39B49-FFE1-4141-AC7D-DEC0690E85F8}" sibTransId="{7764EA43-B182-BC4F-BCDA-333200F918B8}"/>
-    <dgm:cxn modelId="{2D0ABAC6-DA91-8D46-B554-E9457DCF3A92}" type="presOf" srcId="{47AA4630-B738-4650-913F-7378CC40D312}" destId="{7A234B30-A436-41B7-96D9-05CCC2F7ADDC}" srcOrd="0" destOrd="0" presId="urn:microsoft.com/office/officeart/2005/8/layout/process2"/>
-    <dgm:cxn modelId="{3E1261D4-078C-EE4B-AFC6-897F3D5D71BD}" type="presOf" srcId="{EFB1699C-C280-416C-B6B3-B9CB2E52EAA1}" destId="{B2BEE0C4-D8B2-432A-8CB1-C2162205DCA3}" srcOrd="1" destOrd="0" presId="urn:microsoft.com/office/officeart/2005/8/layout/process2"/>
-    <dgm:cxn modelId="{EB39C2AD-FD57-5049-B098-258DD88E7496}" type="presOf" srcId="{04BB66AA-DBE2-4BFD-A94E-A31165187E75}" destId="{E202264D-36A3-408A-9050-7FBD30D2645C}" srcOrd="0" destOrd="0" presId="urn:microsoft.com/office/officeart/2005/8/layout/process2"/>
-    <dgm:cxn modelId="{165AE32A-34E6-4032-86AF-87A045F8F59C}" srcId="{47AA4630-B738-4650-913F-7378CC40D312}" destId="{D8FC48C4-469B-40DC-950F-ABA168836D34}" srcOrd="3" destOrd="0" parTransId="{3B29C759-9861-4F5A-9C39-84993FBBD849}" sibTransId="{CB49FD0C-9B39-4860-B781-669D9FC3FB40}"/>
-    <dgm:cxn modelId="{9DF0477C-A764-8B4F-B772-DEA08EF5B2B1}" type="presOf" srcId="{D8FC48C4-469B-40DC-950F-ABA168836D34}" destId="{3725F2C1-AA1D-49A3-9D73-9D444D08CE71}" srcOrd="0" destOrd="0" presId="urn:microsoft.com/office/officeart/2005/8/layout/process2"/>
-    <dgm:cxn modelId="{33D39394-D06E-3C45-A948-C1FD1F42BE5D}" type="presOf" srcId="{6CD60870-D228-4E7C-AB37-75604251742A}" destId="{3FA6B472-D1F3-409B-BF18-F1310278CB78}" srcOrd="0" destOrd="0" presId="urn:microsoft.com/office/officeart/2005/8/layout/process2"/>
-    <dgm:cxn modelId="{D365E894-A5EB-1247-B4AA-97AE89C3B6F1}" type="presOf" srcId="{EFB1699C-C280-416C-B6B3-B9CB2E52EAA1}" destId="{143F6140-E7F1-4CCF-A9B1-524762512517}" srcOrd="0" destOrd="0" presId="urn:microsoft.com/office/officeart/2005/8/layout/process2"/>
-    <dgm:cxn modelId="{6689F0B5-F6D2-6146-A3CC-16A7F09ECD95}" type="presOf" srcId="{97DB59AD-8506-4A74-BB78-BA533F4FB10F}" destId="{87C32DCB-D7CA-425A-A14D-DC1B34BAA990}" srcOrd="0" destOrd="0" presId="urn:microsoft.com/office/officeart/2005/8/layout/process2"/>
-    <dgm:cxn modelId="{26575D07-F418-0F47-847E-EB1CD13E562B}" type="presOf" srcId="{96BC0EEB-57F0-4267-86F0-4EA98B40D230}" destId="{C45FEE31-6BF1-4E83-9497-1224D8F07991}" srcOrd="0" destOrd="0" presId="urn:microsoft.com/office/officeart/2005/8/layout/process2"/>
-    <dgm:cxn modelId="{9DCAD1AE-AE8F-C542-993A-46832AD7E3F7}" type="presOf" srcId="{04BB66AA-DBE2-4BFD-A94E-A31165187E75}" destId="{E3B3E849-56D6-49C5-932E-7B5B0F9F195C}" srcOrd="1" destOrd="0" presId="urn:microsoft.com/office/officeart/2005/8/layout/process2"/>
-    <dgm:cxn modelId="{258E6188-D24E-5243-86FE-FF33A3DEEA39}" type="presOf" srcId="{7764EA43-B182-BC4F-BCDA-333200F918B8}" destId="{5EB7E61C-215B-AD45-8738-514EF8F5F4E5}" srcOrd="1" destOrd="0" presId="urn:microsoft.com/office/officeart/2005/8/layout/process2"/>
     <dgm:cxn modelId="{15EAEB83-C41B-5C48-9F6E-3898263890BB}" type="presParOf" srcId="{7A234B30-A436-41B7-96D9-05CCC2F7ADDC}" destId="{8B185A30-22C7-6840-8D3E-58B36EE38549}" srcOrd="0" destOrd="0" presId="urn:microsoft.com/office/officeart/2005/8/layout/process2"/>
     <dgm:cxn modelId="{D84D3A96-F045-B440-B21D-D8AE917A4A87}" type="presParOf" srcId="{7A234B30-A436-41B7-96D9-05CCC2F7ADDC}" destId="{66533B70-8731-2345-9B98-5A7A7F80153B}" srcOrd="1" destOrd="0" presId="urn:microsoft.com/office/officeart/2005/8/layout/process2"/>
     <dgm:cxn modelId="{7AFF4E44-A8A0-B346-A202-3F879C6FDA04}" type="presParOf" srcId="{66533B70-8731-2345-9B98-5A7A7F80153B}" destId="{5EB7E61C-215B-AD45-8738-514EF8F5F4E5}" srcOrd="0" destOrd="0" presId="urn:microsoft.com/office/officeart/2005/8/layout/process2"/>
@@ -11217,7 +11217,7 @@
             <a:fld id="{80AC11AF-147E-0A48-A5B0-8DA858D84551}" type="datetimeFigureOut">
               <a:rPr lang="en-US" smtClean="0"/>
               <a:pPr/>
-              <a:t>03/10/16</a:t>
+              <a:t>04/10/16</a:t>
             </a:fld>
             <a:endParaRPr lang="en-US"/>
           </a:p>
@@ -22140,8 +22140,8 @@
         </p:nvSpPr>
         <p:spPr>
           <a:xfrm>
-            <a:off x="6012160" y="2420888"/>
-            <a:ext cx="1869976" cy="415498"/>
+            <a:off x="6012160" y="2276872"/>
+            <a:ext cx="1869976" cy="738664"/>
           </a:xfrm>
           <a:prstGeom prst="rect">
             <a:avLst/>
@@ -22160,6 +22160,15 @@
                 <a:cs typeface="Courier New" pitchFamily="49" charset="0"/>
               </a:rPr>
               <a:t>py.test</a:t>
+            </a:r>
+          </a:p>
+          <a:p>
+            <a:r>
+              <a:rPr lang="en-US" sz="2100" dirty="0" err="1">
+                <a:latin typeface="Courier New" pitchFamily="49" charset="0"/>
+                <a:cs typeface="Courier New" pitchFamily="49" charset="0"/>
+              </a:rPr>
+              <a:t>mock</a:t>
             </a:r>
             <a:endParaRPr lang="en-US" sz="2100" dirty="0" smtClean="0">
               <a:latin typeface="Courier New" pitchFamily="49" charset="0"/>
@@ -31312,7 +31321,7 @@
         <p:spPr>
           <a:xfrm>
             <a:off x="971600" y="2276872"/>
-            <a:ext cx="7162800" cy="2677656"/>
+            <a:ext cx="7162800" cy="3323987"/>
           </a:xfrm>
           <a:prstGeom prst="rect">
             <a:avLst/>
@@ -31690,7 +31699,7 @@
                 <a:latin typeface="Courier New"/>
                 <a:cs typeface="Courier New"/>
               </a:rPr>
-              <a:t>''</a:t>
+              <a:t>’’</a:t>
             </a:r>
             <a:r>
               <a:rPr lang="en-US" sz="1400">
@@ -31755,7 +31764,7 @@
                 <a:latin typeface="Courier New"/>
                 <a:cs typeface="Courier New"/>
               </a:rPr>
-              <a:t>(string, expected):</a:t>
+              <a:t>(string, expected, msg):</a:t>
             </a:r>
             <a:br>
               <a:rPr lang="en-US" sz="1400">
@@ -31820,6 +31829,38 @@
                 <a:cs typeface="Courier New"/>
               </a:rPr>
               <a:t> output == expected</a:t>
+            </a:r>
+          </a:p>
+          <a:p>
+            <a:endParaRPr lang="en-US" sz="1400">
+              <a:solidFill>
+                <a:srgbClr val="000000"/>
+              </a:solidFill>
+              <a:latin typeface="Courier New"/>
+              <a:cs typeface="Courier New"/>
+            </a:endParaRPr>
+          </a:p>
+          <a:p>
+            <a:endParaRPr lang="en-US" sz="1400">
+              <a:solidFill>
+                <a:srgbClr val="000000"/>
+              </a:solidFill>
+              <a:effectLst/>
+              <a:latin typeface="Courier New"/>
+              <a:cs typeface="Courier New"/>
+            </a:endParaRPr>
+          </a:p>
+          <a:p>
+            <a:r>
+              <a:rPr lang="en-US" sz="1400">
+                <a:solidFill>
+                  <a:srgbClr val="000000"/>
+                </a:solidFill>
+                <a:effectLst/>
+                <a:latin typeface="Courier New"/>
+                <a:cs typeface="Courier New"/>
+              </a:rPr>
+              <a:t/>
             </a:r>
             <a:br>
               <a:rPr lang="en-US" sz="1400">
@@ -49489,7 +49530,6 @@
               <a:rPr lang="en-US"/>
               <a:t> flags to True</a:t>
             </a:r>
-            <a:endParaRPr lang="en-US"/>
           </a:p>
           <a:p>
             <a:pPr marL="731520" lvl="1" indent="-457200">
@@ -49524,13 +49564,7 @@
               <a:rPr lang="en-US">
                 <a:cs typeface="Courier New"/>
               </a:rPr>
-              <a:t>Theano will print out a profiling report when script exists,</a:t>
-            </a:r>
-            <a:r>
-              <a:rPr lang="en-US">
-                <a:cs typeface="Courier New"/>
-              </a:rPr>
-              <a:t> or upon request:</a:t>
+              <a:t>Theano will print out a profiling report when script exists, or upon request:</a:t>
             </a:r>
             <a:br>
               <a:rPr lang="en-US">
@@ -49544,10 +49578,6 @@
               </a:rPr>
               <a:t>func.profile.summary()</a:t>
             </a:r>
-            <a:endParaRPr lang="en-US">
-              <a:latin typeface="Courier New"/>
-              <a:cs typeface="Courier New"/>
-            </a:endParaRPr>
           </a:p>
         </p:txBody>
       </p:sp>
@@ -49820,7 +49850,6 @@
               <a:rPr lang="en-US" dirty="0"/>
               <a:t>Save your future self some trouble</a:t>
             </a:r>
-            <a:endParaRPr lang="en-US" dirty="0"/>
           </a:p>
         </p:txBody>
       </p:sp>
@@ -50173,90 +50202,132 @@
           <a:lstStyle/>
           <a:p>
             <a:r>
-              <a:rPr lang="en-US"/>
+              <a:rPr lang="en-US" sz="2000">
+                <a:latin typeface="Courier New"/>
+                <a:cs typeface="Courier New"/>
+              </a:rPr>
               <a:t>root</a:t>
             </a:r>
           </a:p>
           <a:p>
             <a:pPr lvl="1"/>
             <a:r>
-              <a:rPr lang="en-US"/>
+              <a:rPr lang="en-US" sz="2000">
+                <a:latin typeface="Courier New"/>
+                <a:cs typeface="Courier New"/>
+              </a:rPr>
               <a:t>package</a:t>
             </a:r>
           </a:p>
           <a:p>
             <a:pPr lvl="2"/>
             <a:r>
-              <a:rPr lang="en-US"/>
+              <a:rPr lang="en-US">
+                <a:latin typeface="Courier New"/>
+                <a:cs typeface="Courier New"/>
+              </a:rPr>
               <a:t>__init__.py</a:t>
             </a:r>
           </a:p>
           <a:p>
             <a:pPr lvl="2"/>
             <a:r>
-              <a:rPr lang="en-US"/>
+              <a:rPr lang="en-US">
+                <a:latin typeface="Courier New"/>
+                <a:cs typeface="Courier New"/>
+              </a:rPr>
               <a:t>module1.py</a:t>
             </a:r>
           </a:p>
           <a:p>
             <a:pPr lvl="2"/>
             <a:r>
-              <a:rPr lang="en-US"/>
+              <a:rPr lang="en-US">
+                <a:latin typeface="Courier New"/>
+                <a:cs typeface="Courier New"/>
+              </a:rPr>
               <a:t>module2.py</a:t>
             </a:r>
           </a:p>
           <a:p>
             <a:pPr lvl="2"/>
             <a:r>
-              <a:rPr lang="en-US"/>
+              <a:rPr lang="en-US">
+                <a:latin typeface="Courier New"/>
+                <a:cs typeface="Courier New"/>
+              </a:rPr>
               <a:t>tests</a:t>
             </a:r>
           </a:p>
           <a:p>
             <a:pPr lvl="3"/>
             <a:r>
-              <a:rPr lang="en-US"/>
+              <a:rPr lang="en-US" sz="2000">
+                <a:latin typeface="Courier New"/>
+                <a:cs typeface="Courier New"/>
+              </a:rPr>
               <a:t>test_module1.py</a:t>
             </a:r>
           </a:p>
           <a:p>
             <a:pPr lvl="3"/>
             <a:r>
-              <a:rPr lang="en-US"/>
+              <a:rPr lang="en-US" sz="2000">
+                <a:latin typeface="Courier New"/>
+                <a:cs typeface="Courier New"/>
+              </a:rPr>
               <a:t>test_module2.py</a:t>
             </a:r>
           </a:p>
           <a:p>
             <a:pPr lvl="1"/>
             <a:r>
-              <a:rPr lang="en-US"/>
+              <a:rPr lang="en-US" sz="2000">
+                <a:latin typeface="Courier New"/>
+                <a:cs typeface="Courier New"/>
+              </a:rPr>
               <a:t>docs</a:t>
             </a:r>
           </a:p>
           <a:p>
             <a:pPr lvl="1"/>
             <a:r>
-              <a:rPr lang="en-US"/>
+              <a:rPr lang="en-US" sz="2000">
+                <a:latin typeface="Courier New"/>
+                <a:cs typeface="Courier New"/>
+              </a:rPr>
               <a:t>LICENSE.txt</a:t>
             </a:r>
           </a:p>
           <a:p>
             <a:pPr lvl="1"/>
             <a:r>
-              <a:rPr lang="en-US"/>
+              <a:rPr lang="en-US" sz="2000">
+                <a:latin typeface="Courier New"/>
+                <a:cs typeface="Courier New"/>
+              </a:rPr>
               <a:t>README.txt</a:t>
             </a:r>
           </a:p>
           <a:p>
             <a:pPr lvl="1"/>
             <a:r>
-              <a:rPr lang="en-US">
+              <a:rPr lang="en-US" sz="2000">
                 <a:solidFill>
                   <a:srgbClr val="FF0000"/>
                 </a:solidFill>
+                <a:latin typeface="Courier New"/>
+                <a:cs typeface="Courier New"/>
               </a:rPr>
               <a:t>setup.py</a:t>
             </a:r>
+            <a:endParaRPr lang="en-US" sz="1400">
+              <a:solidFill>
+                <a:srgbClr val="FF0000"/>
+              </a:solidFill>
+              <a:latin typeface="Courier New"/>
+              <a:cs typeface="Courier New"/>
+            </a:endParaRPr>
           </a:p>
         </p:txBody>
       </p:sp>

</xml_diff>